<commit_message>
ppt is 70% done
</commit_message>
<xml_diff>
--- a/The_Raise_Of_Bitcoin_And_Other_Cryptocurrencies/Ness.pptx
+++ b/The_Raise_Of_Bitcoin_And_Other_Cryptocurrencies/Ness.pptx
@@ -5,7 +5,7 @@
     <p:sldMasterId id="2147483660" r:id="rId1"/>
   </p:sldMasterIdLst>
   <p:notesMasterIdLst>
-    <p:notesMasterId r:id="rId13"/>
+    <p:notesMasterId r:id="rId17"/>
   </p:notesMasterIdLst>
   <p:sldIdLst>
     <p:sldId id="265" r:id="rId2"/>
@@ -13,12 +13,16 @@
     <p:sldId id="267" r:id="rId4"/>
     <p:sldId id="268" r:id="rId5"/>
     <p:sldId id="269" r:id="rId6"/>
-    <p:sldId id="270" r:id="rId7"/>
-    <p:sldId id="271" r:id="rId8"/>
-    <p:sldId id="272" r:id="rId9"/>
-    <p:sldId id="274" r:id="rId10"/>
-    <p:sldId id="273" r:id="rId11"/>
-    <p:sldId id="263" r:id="rId12"/>
+    <p:sldId id="275" r:id="rId7"/>
+    <p:sldId id="276" r:id="rId8"/>
+    <p:sldId id="277" r:id="rId9"/>
+    <p:sldId id="278" r:id="rId10"/>
+    <p:sldId id="270" r:id="rId11"/>
+    <p:sldId id="271" r:id="rId12"/>
+    <p:sldId id="279" r:id="rId13"/>
+    <p:sldId id="280" r:id="rId14"/>
+    <p:sldId id="281" r:id="rId15"/>
+    <p:sldId id="263" r:id="rId16"/>
   </p:sldIdLst>
   <p:sldSz cx="9144000" cy="6858000" type="screen4x3"/>
   <p:notesSz cx="6858000" cy="9144000"/>
@@ -136,6 +140,18 @@
 </p:presentation>
 </file>
 
+<file path=ppt/commentAuthors.xml><?xml version="1.0" encoding="utf-8"?>
+<p:cmAuthorLst xmlns:a="http://schemas.openxmlformats.org/drawingml/2006/main" xmlns:r="http://schemas.openxmlformats.org/officeDocument/2006/relationships" xmlns:p="http://schemas.openxmlformats.org/presentationml/2006/main">
+  <p:cmAuthor id="1" name="Sagar Mahapatro" initials="SM" lastIdx="1" clrIdx="0">
+    <p:extLst>
+      <p:ext uri="{19B8F6BF-5375-455C-9EA6-DF929625EA0E}">
+        <p15:presenceInfo xmlns:p15="http://schemas.microsoft.com/office/powerpoint/2012/main" userId="S-1-5-21-319957032-662715690-1970745503-11486" providerId="AD"/>
+      </p:ext>
+    </p:extLst>
+  </p:cmAuthor>
+</p:cmAuthorLst>
+</file>
+
 <file path=ppt/notesMasters/notesMaster1.xml><?xml version="1.0" encoding="utf-8"?>
 <p:notesMaster xmlns:a="http://schemas.openxmlformats.org/drawingml/2006/main" xmlns:r="http://schemas.openxmlformats.org/officeDocument/2006/relationships" xmlns:p="http://schemas.openxmlformats.org/presentationml/2006/main">
   <p:cSld>
@@ -218,7 +234,7 @@
           <a:p>
             <a:fld id="{05256E7A-0A8E-45A8-8659-817786436B76}" type="datetimeFigureOut">
               <a:rPr lang="en-US" smtClean="0"/>
-              <a:t>1/8/2018</a:t>
+              <a:t>1/11/2018</a:t>
             </a:fld>
             <a:endParaRPr lang="en-US"/>
           </a:p>
@@ -1626,561 +1642,6 @@
 </p:sldLayout>
 </file>
 
-<file path=ppt/slideLayouts/slideLayout11.xml><?xml version="1.0" encoding="utf-8"?>
-<p:sldLayout xmlns:a="http://schemas.openxmlformats.org/drawingml/2006/main" xmlns:r="http://schemas.openxmlformats.org/officeDocument/2006/relationships" xmlns:p="http://schemas.openxmlformats.org/presentationml/2006/main" userDrawn="1">
-  <p:cSld name="Case Study - Level 1">
-    <p:spTree>
-      <p:nvGrpSpPr>
-        <p:cNvPr id="1" name=""/>
-        <p:cNvGrpSpPr/>
-        <p:nvPr/>
-      </p:nvGrpSpPr>
-      <p:grpSpPr>
-        <a:xfrm>
-          <a:off x="0" y="0"/>
-          <a:ext cx="0" cy="0"/>
-          <a:chOff x="0" y="0"/>
-          <a:chExt cx="0" cy="0"/>
-        </a:xfrm>
-      </p:grpSpPr>
-      <p:sp>
-        <p:nvSpPr>
-          <p:cNvPr id="4" name="Rectangle 3"/>
-          <p:cNvSpPr/>
-          <p:nvPr userDrawn="1"/>
-        </p:nvSpPr>
-        <p:spPr>
-          <a:xfrm>
-            <a:off x="0" y="2741342"/>
-            <a:ext cx="9144000" cy="728252"/>
-          </a:xfrm>
-          <a:prstGeom prst="rect">
-            <a:avLst/>
-          </a:prstGeom>
-          <a:solidFill>
-            <a:srgbClr val="0095CD"/>
-          </a:solidFill>
-          <a:ln>
-            <a:noFill/>
-          </a:ln>
-        </p:spPr>
-        <p:style>
-          <a:lnRef idx="2">
-            <a:schemeClr val="accent1">
-              <a:shade val="50000"/>
-            </a:schemeClr>
-          </a:lnRef>
-          <a:fillRef idx="1">
-            <a:schemeClr val="accent1"/>
-          </a:fillRef>
-          <a:effectRef idx="0">
-            <a:schemeClr val="accent1"/>
-          </a:effectRef>
-          <a:fontRef idx="minor">
-            <a:schemeClr val="lt1"/>
-          </a:fontRef>
-        </p:style>
-        <p:txBody>
-          <a:bodyPr rtlCol="0" anchor="ctr"/>
-          <a:lstStyle/>
-          <a:p>
-            <a:pPr algn="ctr" defTabSz="457200"/>
-            <a:endParaRPr lang="en-US">
-              <a:solidFill>
-                <a:srgbClr val="FFFFFF"/>
-              </a:solidFill>
-            </a:endParaRPr>
-          </a:p>
-        </p:txBody>
-      </p:sp>
-      <p:sp>
-        <p:nvSpPr>
-          <p:cNvPr id="3" name="Content Placeholder 2"/>
-          <p:cNvSpPr>
-            <a:spLocks noGrp="1"/>
-          </p:cNvSpPr>
-          <p:nvPr>
-            <p:ph sz="half" idx="1"/>
-          </p:nvPr>
-        </p:nvSpPr>
-        <p:spPr>
-          <a:xfrm>
-            <a:off x="329184" y="3895724"/>
-            <a:ext cx="2687481" cy="2504574"/>
-          </a:xfrm>
-          <a:prstGeom prst="rect">
-            <a:avLst/>
-          </a:prstGeom>
-        </p:spPr>
-        <p:txBody>
-          <a:bodyPr/>
-          <a:lstStyle>
-            <a:lvl1pPr marL="111125" indent="-111125" algn="l" defTabSz="914400" rtl="0" eaLnBrk="1" latinLnBrk="0" hangingPunct="1">
-              <a:lnSpc>
-                <a:spcPct val="110000"/>
-              </a:lnSpc>
-              <a:spcBef>
-                <a:spcPts val="325"/>
-              </a:spcBef>
-              <a:buFont typeface="Arial" pitchFamily="34" charset="0"/>
-              <a:buChar char="•"/>
-              <a:defRPr lang="en-US" sz="1200" kern="1200" dirty="0" smtClean="0">
-                <a:solidFill>
-                  <a:srgbClr val="000000"/>
-                </a:solidFill>
-                <a:latin typeface="+mj-lt"/>
-                <a:ea typeface="MS PGothic" pitchFamily="34" charset="-128"/>
-                <a:cs typeface="Helvetica" panose="020B0604020202020204" pitchFamily="34" charset="0"/>
-              </a:defRPr>
-            </a:lvl1pPr>
-            <a:lvl2pPr>
-              <a:defRPr sz="2400"/>
-            </a:lvl2pPr>
-            <a:lvl3pPr>
-              <a:defRPr sz="2000"/>
-            </a:lvl3pPr>
-            <a:lvl4pPr>
-              <a:defRPr sz="1800"/>
-            </a:lvl4pPr>
-            <a:lvl5pPr>
-              <a:defRPr sz="1800"/>
-            </a:lvl5pPr>
-            <a:lvl6pPr>
-              <a:defRPr sz="1800"/>
-            </a:lvl6pPr>
-            <a:lvl7pPr>
-              <a:defRPr sz="1800"/>
-            </a:lvl7pPr>
-            <a:lvl8pPr>
-              <a:defRPr sz="1800"/>
-            </a:lvl8pPr>
-            <a:lvl9pPr>
-              <a:defRPr sz="1800"/>
-            </a:lvl9pPr>
-          </a:lstStyle>
-          <a:p>
-            <a:pPr lvl="0"/>
-            <a:r>
-              <a:rPr lang="en-US" smtClean="0"/>
-              <a:t>Click to edit Master text styles</a:t>
-            </a:r>
-          </a:p>
-        </p:txBody>
-      </p:sp>
-      <p:sp>
-        <p:nvSpPr>
-          <p:cNvPr id="7" name="Picture Placeholder 6"/>
-          <p:cNvSpPr>
-            <a:spLocks noGrp="1"/>
-          </p:cNvSpPr>
-          <p:nvPr>
-            <p:ph type="pic" sz="quarter" idx="10"/>
-          </p:nvPr>
-        </p:nvSpPr>
-        <p:spPr>
-          <a:xfrm>
-            <a:off x="0" y="1"/>
-            <a:ext cx="9144000" cy="2741340"/>
-          </a:xfrm>
-          <a:prstGeom prst="rect">
-            <a:avLst/>
-          </a:prstGeom>
-        </p:spPr>
-        <p:txBody>
-          <a:bodyPr/>
-          <a:lstStyle>
-            <a:lvl1pPr marL="0" indent="0">
-              <a:buNone/>
-              <a:defRPr>
-                <a:latin typeface="+mj-lt"/>
-              </a:defRPr>
-            </a:lvl1pPr>
-          </a:lstStyle>
-          <a:p>
-            <a:r>
-              <a:rPr lang="en-US" smtClean="0"/>
-              <a:t>Click icon to add picture</a:t>
-            </a:r>
-            <a:endParaRPr lang="en-US" dirty="0"/>
-          </a:p>
-        </p:txBody>
-      </p:sp>
-      <p:sp>
-        <p:nvSpPr>
-          <p:cNvPr id="14" name="Title 5"/>
-          <p:cNvSpPr>
-            <a:spLocks noGrp="1"/>
-          </p:cNvSpPr>
-          <p:nvPr>
-            <p:ph type="title"/>
-          </p:nvPr>
-        </p:nvSpPr>
-        <p:spPr>
-          <a:xfrm>
-            <a:off x="329184" y="2969379"/>
-            <a:ext cx="8403336" cy="457200"/>
-          </a:xfrm>
-          <a:prstGeom prst="rect">
-            <a:avLst/>
-          </a:prstGeom>
-        </p:spPr>
-        <p:txBody>
-          <a:bodyPr/>
-          <a:lstStyle>
-            <a:lvl1pPr algn="l">
-              <a:defRPr lang="en-US" sz="2400" kern="1200" dirty="0">
-                <a:solidFill>
-                  <a:schemeClr val="bg1"/>
-                </a:solidFill>
-                <a:latin typeface="+mj-lt"/>
-                <a:ea typeface="+mn-ea"/>
-                <a:cs typeface="Helvetica" panose="020B0604020202020204" pitchFamily="34" charset="0"/>
-              </a:defRPr>
-            </a:lvl1pPr>
-          </a:lstStyle>
-          <a:p>
-            <a:r>
-              <a:rPr lang="en-US" smtClean="0"/>
-              <a:t>Click to edit Master title style</a:t>
-            </a:r>
-            <a:endParaRPr lang="en-US" dirty="0"/>
-          </a:p>
-        </p:txBody>
-      </p:sp>
-      <p:sp>
-        <p:nvSpPr>
-          <p:cNvPr id="2" name="TextBox 1"/>
-          <p:cNvSpPr txBox="1"/>
-          <p:nvPr userDrawn="1"/>
-        </p:nvSpPr>
-        <p:spPr>
-          <a:xfrm>
-            <a:off x="330200" y="2758433"/>
-            <a:ext cx="1244251" cy="338554"/>
-          </a:xfrm>
-          <a:prstGeom prst="rect">
-            <a:avLst/>
-          </a:prstGeom>
-          <a:noFill/>
-        </p:spPr>
-        <p:txBody>
-          <a:bodyPr wrap="none" rtlCol="0">
-            <a:spAutoFit/>
-          </a:bodyPr>
-          <a:lstStyle/>
-          <a:p>
-            <a:pPr defTabSz="457200"/>
-            <a:r>
-              <a:rPr lang="en-US" sz="1600" dirty="0">
-                <a:solidFill>
-                  <a:srgbClr val="000000"/>
-                </a:solidFill>
-              </a:rPr>
-              <a:t>Case Study</a:t>
-            </a:r>
-          </a:p>
-        </p:txBody>
-      </p:sp>
-      <p:sp>
-        <p:nvSpPr>
-          <p:cNvPr id="9" name="Content Placeholder 2"/>
-          <p:cNvSpPr>
-            <a:spLocks noGrp="1"/>
-          </p:cNvSpPr>
-          <p:nvPr>
-            <p:ph sz="half" idx="11"/>
-          </p:nvPr>
-        </p:nvSpPr>
-        <p:spPr>
-          <a:xfrm>
-            <a:off x="3228259" y="3895724"/>
-            <a:ext cx="2687481" cy="2504574"/>
-          </a:xfrm>
-          <a:prstGeom prst="rect">
-            <a:avLst/>
-          </a:prstGeom>
-        </p:spPr>
-        <p:txBody>
-          <a:bodyPr/>
-          <a:lstStyle>
-            <a:lvl1pPr marL="111125" indent="-111125" algn="l" defTabSz="914400" rtl="0" eaLnBrk="1" latinLnBrk="0" hangingPunct="1">
-              <a:lnSpc>
-                <a:spcPct val="110000"/>
-              </a:lnSpc>
-              <a:spcBef>
-                <a:spcPts val="325"/>
-              </a:spcBef>
-              <a:buFont typeface="Arial" pitchFamily="34" charset="0"/>
-              <a:buChar char="•"/>
-              <a:defRPr lang="en-US" sz="1200" kern="1200" dirty="0" smtClean="0">
-                <a:solidFill>
-                  <a:srgbClr val="000000"/>
-                </a:solidFill>
-                <a:latin typeface="+mj-lt"/>
-                <a:ea typeface="MS PGothic" pitchFamily="34" charset="-128"/>
-                <a:cs typeface="Helvetica" panose="020B0604020202020204" pitchFamily="34" charset="0"/>
-              </a:defRPr>
-            </a:lvl1pPr>
-            <a:lvl2pPr>
-              <a:defRPr sz="2400"/>
-            </a:lvl2pPr>
-            <a:lvl3pPr>
-              <a:defRPr sz="2000"/>
-            </a:lvl3pPr>
-            <a:lvl4pPr>
-              <a:defRPr sz="1800"/>
-            </a:lvl4pPr>
-            <a:lvl5pPr>
-              <a:defRPr sz="1800"/>
-            </a:lvl5pPr>
-            <a:lvl6pPr>
-              <a:defRPr sz="1800"/>
-            </a:lvl6pPr>
-            <a:lvl7pPr>
-              <a:defRPr sz="1800"/>
-            </a:lvl7pPr>
-            <a:lvl8pPr>
-              <a:defRPr sz="1800"/>
-            </a:lvl8pPr>
-            <a:lvl9pPr>
-              <a:defRPr sz="1800"/>
-            </a:lvl9pPr>
-          </a:lstStyle>
-          <a:p>
-            <a:pPr lvl="0"/>
-            <a:r>
-              <a:rPr lang="en-US" smtClean="0"/>
-              <a:t>Click to edit Master text styles</a:t>
-            </a:r>
-          </a:p>
-        </p:txBody>
-      </p:sp>
-      <p:sp>
-        <p:nvSpPr>
-          <p:cNvPr id="10" name="Content Placeholder 2"/>
-          <p:cNvSpPr>
-            <a:spLocks noGrp="1"/>
-          </p:cNvSpPr>
-          <p:nvPr>
-            <p:ph sz="half" idx="12"/>
-          </p:nvPr>
-        </p:nvSpPr>
-        <p:spPr>
-          <a:xfrm>
-            <a:off x="6047089" y="3895724"/>
-            <a:ext cx="2687481" cy="2240155"/>
-          </a:xfrm>
-          <a:prstGeom prst="rect">
-            <a:avLst/>
-          </a:prstGeom>
-        </p:spPr>
-        <p:txBody>
-          <a:bodyPr/>
-          <a:lstStyle>
-            <a:lvl1pPr marL="111125" indent="-111125" algn="l" defTabSz="914400" rtl="0" eaLnBrk="1" latinLnBrk="0" hangingPunct="1">
-              <a:lnSpc>
-                <a:spcPct val="110000"/>
-              </a:lnSpc>
-              <a:spcBef>
-                <a:spcPts val="325"/>
-              </a:spcBef>
-              <a:buFont typeface="Arial" pitchFamily="34" charset="0"/>
-              <a:buChar char="•"/>
-              <a:defRPr lang="en-US" sz="1200" kern="1200" dirty="0" smtClean="0">
-                <a:solidFill>
-                  <a:srgbClr val="000000"/>
-                </a:solidFill>
-                <a:latin typeface="+mj-lt"/>
-                <a:ea typeface="MS PGothic" pitchFamily="34" charset="-128"/>
-                <a:cs typeface="Helvetica" panose="020B0604020202020204" pitchFamily="34" charset="0"/>
-              </a:defRPr>
-            </a:lvl1pPr>
-            <a:lvl2pPr>
-              <a:defRPr sz="2400"/>
-            </a:lvl2pPr>
-            <a:lvl3pPr>
-              <a:defRPr sz="2000"/>
-            </a:lvl3pPr>
-            <a:lvl4pPr>
-              <a:defRPr sz="1800"/>
-            </a:lvl4pPr>
-            <a:lvl5pPr>
-              <a:defRPr sz="1800"/>
-            </a:lvl5pPr>
-            <a:lvl6pPr>
-              <a:defRPr sz="1800"/>
-            </a:lvl6pPr>
-            <a:lvl7pPr>
-              <a:defRPr sz="1800"/>
-            </a:lvl7pPr>
-            <a:lvl8pPr>
-              <a:defRPr sz="1800"/>
-            </a:lvl8pPr>
-            <a:lvl9pPr>
-              <a:defRPr sz="1800"/>
-            </a:lvl9pPr>
-          </a:lstStyle>
-          <a:p>
-            <a:pPr lvl="0"/>
-            <a:r>
-              <a:rPr lang="en-US" smtClean="0"/>
-              <a:t>Click to edit Master text styles</a:t>
-            </a:r>
-          </a:p>
-        </p:txBody>
-      </p:sp>
-      <p:sp>
-        <p:nvSpPr>
-          <p:cNvPr id="6" name="Rectangle 5"/>
-          <p:cNvSpPr/>
-          <p:nvPr userDrawn="1"/>
-        </p:nvSpPr>
-        <p:spPr>
-          <a:xfrm>
-            <a:off x="330200" y="3547283"/>
-            <a:ext cx="1768433" cy="307777"/>
-          </a:xfrm>
-          <a:prstGeom prst="rect">
-            <a:avLst/>
-          </a:prstGeom>
-        </p:spPr>
-        <p:txBody>
-          <a:bodyPr wrap="none">
-            <a:spAutoFit/>
-          </a:bodyPr>
-          <a:lstStyle/>
-          <a:p>
-            <a:pPr defTabSz="457200"/>
-            <a:r>
-              <a:rPr lang="en-US" sz="1400" dirty="0">
-                <a:solidFill>
-                  <a:srgbClr val="0095CD"/>
-                </a:solidFill>
-                <a:ea typeface="MS PGothic" pitchFamily="34" charset="-128"/>
-                <a:cs typeface="Arial"/>
-              </a:rPr>
-              <a:t>Business Challenge</a:t>
-            </a:r>
-            <a:endParaRPr lang="en-US" dirty="0">
-              <a:solidFill>
-                <a:srgbClr val="0095CD"/>
-              </a:solidFill>
-            </a:endParaRPr>
-          </a:p>
-        </p:txBody>
-      </p:sp>
-      <p:sp>
-        <p:nvSpPr>
-          <p:cNvPr id="11" name="Rectangle 10"/>
-          <p:cNvSpPr/>
-          <p:nvPr userDrawn="1"/>
-        </p:nvSpPr>
-        <p:spPr>
-          <a:xfrm>
-            <a:off x="3228259" y="3547282"/>
-            <a:ext cx="1290738" cy="307777"/>
-          </a:xfrm>
-          <a:prstGeom prst="rect">
-            <a:avLst/>
-          </a:prstGeom>
-        </p:spPr>
-        <p:txBody>
-          <a:bodyPr wrap="none">
-            <a:spAutoFit/>
-          </a:bodyPr>
-          <a:lstStyle/>
-          <a:p>
-            <a:pPr defTabSz="457200"/>
-            <a:r>
-              <a:rPr lang="en-US" sz="1400" dirty="0">
-                <a:solidFill>
-                  <a:srgbClr val="0095CD"/>
-                </a:solidFill>
-                <a:ea typeface="MS PGothic" pitchFamily="34" charset="-128"/>
-                <a:cs typeface="Arial"/>
-              </a:rPr>
-              <a:t>Ness Solution</a:t>
-            </a:r>
-            <a:endParaRPr lang="en-US" dirty="0">
-              <a:solidFill>
-                <a:srgbClr val="0095CD"/>
-              </a:solidFill>
-            </a:endParaRPr>
-          </a:p>
-        </p:txBody>
-      </p:sp>
-      <p:sp>
-        <p:nvSpPr>
-          <p:cNvPr id="12" name="Rectangle 11"/>
-          <p:cNvSpPr/>
-          <p:nvPr userDrawn="1"/>
-        </p:nvSpPr>
-        <p:spPr>
-          <a:xfrm>
-            <a:off x="6047089" y="3547281"/>
-            <a:ext cx="782587" cy="307777"/>
-          </a:xfrm>
-          <a:prstGeom prst="rect">
-            <a:avLst/>
-          </a:prstGeom>
-        </p:spPr>
-        <p:txBody>
-          <a:bodyPr wrap="none">
-            <a:spAutoFit/>
-          </a:bodyPr>
-          <a:lstStyle/>
-          <a:p>
-            <a:pPr defTabSz="457200"/>
-            <a:r>
-              <a:rPr lang="en-US" sz="1400" dirty="0">
-                <a:solidFill>
-                  <a:srgbClr val="0095CD"/>
-                </a:solidFill>
-                <a:ea typeface="MS PGothic" pitchFamily="34" charset="-128"/>
-                <a:cs typeface="Arial"/>
-              </a:rPr>
-              <a:t>Results</a:t>
-            </a:r>
-            <a:endParaRPr lang="en-US" dirty="0">
-              <a:solidFill>
-                <a:srgbClr val="0095CD"/>
-              </a:solidFill>
-            </a:endParaRPr>
-          </a:p>
-        </p:txBody>
-      </p:sp>
-    </p:spTree>
-    <p:extLst>
-      <p:ext uri="{BB962C8B-B14F-4D97-AF65-F5344CB8AC3E}">
-        <p14:creationId xmlns:p14="http://schemas.microsoft.com/office/powerpoint/2010/main" val="2747831427"/>
-      </p:ext>
-    </p:extLst>
-  </p:cSld>
-  <p:clrMapOvr>
-    <a:masterClrMapping/>
-  </p:clrMapOvr>
-  <mc:AlternateContent xmlns:mc="http://schemas.openxmlformats.org/markup-compatibility/2006" xmlns:p14="http://schemas.microsoft.com/office/powerpoint/2010/main">
-    <mc:Choice Requires="p14">
-      <p:transition spd="med" p14:dur="700">
-        <p:fade/>
-      </p:transition>
-    </mc:Choice>
-    <mc:Fallback xmlns="">
-      <p:transition xmlns:p14="http://schemas.microsoft.com/office/powerpoint/2010/main" spd="med">
-        <p:fade/>
-      </p:transition>
-    </mc:Fallback>
-  </mc:AlternateContent>
-  <p:timing>
-    <p:tnLst>
-      <p:par>
-        <p:cTn id="1" dur="indefinite" restart="never" nodeType="tmRoot"/>
-      </p:par>
-    </p:tnLst>
-  </p:timing>
-</p:sldLayout>
-</file>
-
 <file path=ppt/slideLayouts/slideLayout2.xml><?xml version="1.0" encoding="utf-8"?>
 <p:sldLayout xmlns:a="http://schemas.openxmlformats.org/drawingml/2006/main" xmlns:r="http://schemas.openxmlformats.org/officeDocument/2006/relationships" xmlns:p="http://schemas.openxmlformats.org/presentationml/2006/main" type="secHead" preserve="1">
   <p:cSld name="Section Header">
@@ -4193,7 +3654,7 @@
           <p:nvPr/>
         </p:nvPicPr>
         <p:blipFill>
-          <a:blip r:embed="rId13" cstate="print">
+          <a:blip r:embed="rId12" cstate="print">
             <a:extLst>
               <a:ext uri="{28A0092B-C50C-407E-A947-70E740481C1C}">
                 <a14:useLocalDpi xmlns:a14="http://schemas.microsoft.com/office/drawing/2010/main" val="0"/>
@@ -4277,7 +3738,6 @@
     <p:sldLayoutId id="2147483669" r:id="rId8"/>
     <p:sldLayoutId id="2147483671" r:id="rId9"/>
     <p:sldLayoutId id="2147483672" r:id="rId10"/>
-    <p:sldLayoutId id="2147483674" r:id="rId11"/>
   </p:sldLayoutIdLst>
   <p:timing>
     <p:tnLst>
@@ -4715,38 +4175,66 @@
             <p:ph type="title"/>
           </p:nvPr>
         </p:nvSpPr>
-        <p:spPr/>
+        <p:spPr>
+          <a:xfrm>
+            <a:off x="370331" y="260648"/>
+            <a:ext cx="8403336" cy="457200"/>
+          </a:xfrm>
+        </p:spPr>
         <p:txBody>
           <a:bodyPr/>
           <a:lstStyle/>
           <a:p>
-            <a:endParaRPr lang="en-US"/>
-          </a:p>
-        </p:txBody>
-      </p:sp>
-      <p:sp>
-        <p:nvSpPr>
-          <p:cNvPr id="3" name="Content Placeholder 2"/>
-          <p:cNvSpPr>
-            <a:spLocks noGrp="1"/>
-          </p:cNvSpPr>
-          <p:nvPr>
-            <p:ph idx="1"/>
-          </p:nvPr>
-        </p:nvSpPr>
-        <p:spPr/>
-        <p:txBody>
-          <a:bodyPr/>
-          <a:lstStyle/>
-          <a:p>
-            <a:endParaRPr lang="en-US"/>
-          </a:p>
-        </p:txBody>
-      </p:sp>
+            <a:r>
+              <a:rPr lang="en-US" dirty="0" smtClean="0"/>
+              <a:t>How </a:t>
+            </a:r>
+            <a:r>
+              <a:rPr lang="en-US" dirty="0" err="1" smtClean="0"/>
+              <a:t>Bitcoin</a:t>
+            </a:r>
+            <a:r>
+              <a:rPr lang="en-US" dirty="0" smtClean="0"/>
+              <a:t> works?</a:t>
+            </a:r>
+            <a:endParaRPr lang="en-US" dirty="0"/>
+          </a:p>
+        </p:txBody>
+      </p:sp>
+      <p:pic>
+        <p:nvPicPr>
+          <p:cNvPr id="8" name="Picture 7"/>
+          <p:cNvPicPr>
+            <a:picLocks noChangeAspect="1"/>
+          </p:cNvPicPr>
+          <p:nvPr/>
+        </p:nvPicPr>
+        <p:blipFill>
+          <a:blip r:embed="rId2">
+            <a:extLst>
+              <a:ext uri="{28A0092B-C50C-407E-A947-70E740481C1C}">
+                <a14:useLocalDpi xmlns:a14="http://schemas.microsoft.com/office/drawing/2010/main" val="0"/>
+              </a:ext>
+            </a:extLst>
+          </a:blip>
+          <a:stretch>
+            <a:fillRect/>
+          </a:stretch>
+        </p:blipFill>
+        <p:spPr>
+          <a:xfrm>
+            <a:off x="53930" y="0"/>
+            <a:ext cx="9036139" cy="6858000"/>
+          </a:xfrm>
+          <a:prstGeom prst="rect">
+            <a:avLst/>
+          </a:prstGeom>
+        </p:spPr>
+      </p:pic>
     </p:spTree>
     <p:extLst>
       <p:ext uri="{BB962C8B-B14F-4D97-AF65-F5344CB8AC3E}">
-        <p14:creationId xmlns:p14="http://schemas.microsoft.com/office/powerpoint/2010/main" val="4140896736"/>
+        <p14:creationId xmlns:p14="http://schemas.microsoft.com/office/powerpoint/2010/main" val="1263475699"/>
       </p:ext>
     </p:extLst>
   </p:cSld>
@@ -4757,6 +4245,841 @@
 </file>
 
 <file path=ppt/slides/slide11.xml><?xml version="1.0" encoding="utf-8"?>
+<p:sld xmlns:a="http://schemas.openxmlformats.org/drawingml/2006/main" xmlns:r="http://schemas.openxmlformats.org/officeDocument/2006/relationships" xmlns:p="http://schemas.openxmlformats.org/presentationml/2006/main">
+  <p:cSld>
+    <p:spTree>
+      <p:nvGrpSpPr>
+        <p:cNvPr id="1" name=""/>
+        <p:cNvGrpSpPr/>
+        <p:nvPr/>
+      </p:nvGrpSpPr>
+      <p:grpSpPr>
+        <a:xfrm>
+          <a:off x="0" y="0"/>
+          <a:ext cx="0" cy="0"/>
+          <a:chOff x="0" y="0"/>
+          <a:chExt cx="0" cy="0"/>
+        </a:xfrm>
+      </p:grpSpPr>
+      <p:sp>
+        <p:nvSpPr>
+          <p:cNvPr id="4" name="Title 3"/>
+          <p:cNvSpPr>
+            <a:spLocks noGrp="1"/>
+          </p:cNvSpPr>
+          <p:nvPr>
+            <p:ph type="title"/>
+          </p:nvPr>
+        </p:nvSpPr>
+        <p:spPr/>
+        <p:txBody>
+          <a:bodyPr/>
+          <a:lstStyle/>
+          <a:p>
+            <a:r>
+              <a:rPr lang="en-US" dirty="0" smtClean="0"/>
+              <a:t>Buy and Sell Bit coins</a:t>
+            </a:r>
+            <a:endParaRPr lang="en-US" dirty="0"/>
+          </a:p>
+        </p:txBody>
+      </p:sp>
+      <p:pic>
+        <p:nvPicPr>
+          <p:cNvPr id="5" name="Picture 4"/>
+          <p:cNvPicPr>
+            <a:picLocks noChangeAspect="1"/>
+          </p:cNvPicPr>
+          <p:nvPr/>
+        </p:nvPicPr>
+        <p:blipFill>
+          <a:blip r:embed="rId2">
+            <a:extLst>
+              <a:ext uri="{28A0092B-C50C-407E-A947-70E740481C1C}">
+                <a14:useLocalDpi xmlns:a14="http://schemas.microsoft.com/office/drawing/2010/main" val="0"/>
+              </a:ext>
+            </a:extLst>
+          </a:blip>
+          <a:stretch>
+            <a:fillRect/>
+          </a:stretch>
+        </p:blipFill>
+        <p:spPr>
+          <a:xfrm>
+            <a:off x="0" y="857250"/>
+            <a:ext cx="9144000" cy="5143500"/>
+          </a:xfrm>
+          <a:prstGeom prst="rect">
+            <a:avLst/>
+          </a:prstGeom>
+        </p:spPr>
+      </p:pic>
+    </p:spTree>
+    <p:extLst>
+      <p:ext uri="{BB962C8B-B14F-4D97-AF65-F5344CB8AC3E}">
+        <p14:creationId xmlns:p14="http://schemas.microsoft.com/office/powerpoint/2010/main" val="3743229450"/>
+      </p:ext>
+    </p:extLst>
+  </p:cSld>
+  <p:clrMapOvr>
+    <a:masterClrMapping/>
+  </p:clrMapOvr>
+  <mc:AlternateContent xmlns:mc="http://schemas.openxmlformats.org/markup-compatibility/2006" xmlns:p14="http://schemas.microsoft.com/office/powerpoint/2010/main">
+    <mc:Choice Requires="p14">
+      <p:transition spd="slow" p14:dur="2000"/>
+    </mc:Choice>
+    <mc:Fallback xmlns="">
+      <p:transition spd="slow"/>
+    </mc:Fallback>
+  </mc:AlternateContent>
+</p:sld>
+</file>
+
+<file path=ppt/slides/slide12.xml><?xml version="1.0" encoding="utf-8"?>
+<p:sld xmlns:a="http://schemas.openxmlformats.org/drawingml/2006/main" xmlns:r="http://schemas.openxmlformats.org/officeDocument/2006/relationships" xmlns:p="http://schemas.openxmlformats.org/presentationml/2006/main">
+  <p:cSld>
+    <p:spTree>
+      <p:nvGrpSpPr>
+        <p:cNvPr id="1" name=""/>
+        <p:cNvGrpSpPr/>
+        <p:nvPr/>
+      </p:nvGrpSpPr>
+      <p:grpSpPr>
+        <a:xfrm>
+          <a:off x="0" y="0"/>
+          <a:ext cx="0" cy="0"/>
+          <a:chOff x="0" y="0"/>
+          <a:chExt cx="0" cy="0"/>
+        </a:xfrm>
+      </p:grpSpPr>
+      <p:sp>
+        <p:nvSpPr>
+          <p:cNvPr id="4" name="Title 3"/>
+          <p:cNvSpPr>
+            <a:spLocks noGrp="1"/>
+          </p:cNvSpPr>
+          <p:nvPr>
+            <p:ph type="title"/>
+          </p:nvPr>
+        </p:nvSpPr>
+        <p:spPr/>
+        <p:txBody>
+          <a:bodyPr/>
+          <a:lstStyle/>
+          <a:p>
+            <a:r>
+              <a:rPr lang="en-IN" dirty="0" smtClean="0"/>
+              <a:t>Continue….</a:t>
+            </a:r>
+            <a:endParaRPr lang="en-IN" dirty="0"/>
+          </a:p>
+        </p:txBody>
+      </p:sp>
+      <p:sp>
+        <p:nvSpPr>
+          <p:cNvPr id="5" name="TextBox 4"/>
+          <p:cNvSpPr txBox="1"/>
+          <p:nvPr/>
+        </p:nvSpPr>
+        <p:spPr>
+          <a:xfrm>
+            <a:off x="395536" y="1412776"/>
+            <a:ext cx="8136904" cy="923330"/>
+          </a:xfrm>
+          <a:prstGeom prst="rect">
+            <a:avLst/>
+          </a:prstGeom>
+          <a:noFill/>
+        </p:spPr>
+        <p:txBody>
+          <a:bodyPr wrap="square" rtlCol="0">
+            <a:spAutoFit/>
+          </a:bodyPr>
+          <a:lstStyle/>
+          <a:p>
+            <a:pPr marL="285750" indent="-285750">
+              <a:buFont typeface="Arial" panose="020B0604020202020204" pitchFamily="34" charset="0"/>
+              <a:buChar char="•"/>
+            </a:pPr>
+            <a:r>
+              <a:rPr lang="en-IN" dirty="0" err="1" smtClean="0"/>
+              <a:t>Zepbay</a:t>
+            </a:r>
+            <a:endParaRPr lang="en-IN" dirty="0" smtClean="0"/>
+          </a:p>
+          <a:p>
+            <a:pPr marL="285750" indent="-285750">
+              <a:buFont typeface="Arial" panose="020B0604020202020204" pitchFamily="34" charset="0"/>
+              <a:buChar char="•"/>
+            </a:pPr>
+            <a:r>
+              <a:rPr lang="en-IN" dirty="0" err="1" smtClean="0"/>
+              <a:t>Unocoin</a:t>
+            </a:r>
+            <a:endParaRPr lang="en-IN" dirty="0" smtClean="0"/>
+          </a:p>
+          <a:p>
+            <a:pPr marL="285750" indent="-285750">
+              <a:buFont typeface="Arial" panose="020B0604020202020204" pitchFamily="34" charset="0"/>
+              <a:buChar char="•"/>
+            </a:pPr>
+            <a:r>
+              <a:rPr lang="en-IN" dirty="0" err="1" smtClean="0"/>
+              <a:t>Coinsecure</a:t>
+            </a:r>
+            <a:endParaRPr lang="en-IN" dirty="0"/>
+          </a:p>
+        </p:txBody>
+      </p:sp>
+      <p:sp>
+        <p:nvSpPr>
+          <p:cNvPr id="6" name="TextBox 5"/>
+          <p:cNvSpPr txBox="1"/>
+          <p:nvPr/>
+        </p:nvSpPr>
+        <p:spPr>
+          <a:xfrm>
+            <a:off x="395536" y="2492896"/>
+            <a:ext cx="8748464" cy="4247317"/>
+          </a:xfrm>
+          <a:prstGeom prst="rect">
+            <a:avLst/>
+          </a:prstGeom>
+          <a:noFill/>
+        </p:spPr>
+        <p:txBody>
+          <a:bodyPr wrap="square" rtlCol="0">
+            <a:spAutoFit/>
+          </a:bodyPr>
+          <a:lstStyle/>
+          <a:p>
+            <a:r>
+              <a:rPr lang="en-IN" dirty="0" smtClean="0"/>
+              <a:t>Hot Wallet:</a:t>
+            </a:r>
+          </a:p>
+          <a:p>
+            <a:r>
+              <a:rPr lang="en-IN" dirty="0" smtClean="0"/>
+              <a:t>Most </a:t>
+            </a:r>
+            <a:r>
+              <a:rPr lang="en-IN" dirty="0"/>
+              <a:t>of the web and mobile wallet software services in the </a:t>
+            </a:r>
+            <a:r>
+              <a:rPr lang="en-IN" dirty="0" err="1"/>
+              <a:t>Bitcoin</a:t>
+            </a:r>
+            <a:r>
+              <a:rPr lang="en-IN" dirty="0"/>
+              <a:t> market store your private key on your behalf on their servers</a:t>
+            </a:r>
+            <a:r>
+              <a:rPr lang="en-IN" dirty="0" smtClean="0"/>
+              <a:t>.</a:t>
+            </a:r>
+            <a:br>
+              <a:rPr lang="en-IN" dirty="0" smtClean="0"/>
+            </a:br>
+            <a:r>
+              <a:rPr lang="en-IN" dirty="0" smtClean="0"/>
+              <a:t/>
+            </a:r>
+            <a:br>
+              <a:rPr lang="en-IN" dirty="0" smtClean="0"/>
+            </a:br>
+            <a:r>
+              <a:rPr lang="en-IN" dirty="0"/>
+              <a:t>They get stored in an encrypted form which only you can decrypt</a:t>
+            </a:r>
+            <a:r>
+              <a:rPr lang="en-IN" dirty="0" smtClean="0"/>
+              <a:t>.</a:t>
+            </a:r>
+          </a:p>
+          <a:p>
+            <a:endParaRPr lang="en-IN" dirty="0" smtClean="0"/>
+          </a:p>
+          <a:p>
+            <a:r>
+              <a:rPr lang="en-IN" dirty="0" smtClean="0"/>
+              <a:t>Cold </a:t>
+            </a:r>
+            <a:r>
+              <a:rPr lang="en-IN" dirty="0"/>
+              <a:t>Wallet:</a:t>
+            </a:r>
+          </a:p>
+          <a:p>
+            <a:r>
+              <a:rPr lang="en-IN" dirty="0" smtClean="0"/>
+              <a:t>Desktop </a:t>
+            </a:r>
+            <a:r>
+              <a:rPr lang="en-IN" dirty="0"/>
+              <a:t>wallets are relatively safe. In such wallets, once you install them on your desktop, you will get your </a:t>
+            </a:r>
+            <a:r>
+              <a:rPr lang="en-IN" dirty="0" err="1"/>
+              <a:t>Bitcoin</a:t>
+            </a:r>
+            <a:r>
+              <a:rPr lang="en-IN" dirty="0"/>
+              <a:t> address and private key in a downloadable and importable file.</a:t>
+            </a:r>
+          </a:p>
+          <a:p>
+            <a:r>
+              <a:rPr lang="en-IN" dirty="0"/>
+              <a:t>These importable keys can be made password protected and stored on a memory stick or hard drive</a:t>
+            </a:r>
+            <a:r>
+              <a:rPr lang="en-IN" dirty="0" smtClean="0"/>
+              <a:t>.</a:t>
+            </a:r>
+          </a:p>
+          <a:p>
+            <a:endParaRPr lang="en-IN" dirty="0"/>
+          </a:p>
+          <a:p>
+            <a:r>
+              <a:rPr lang="en-IN" dirty="0" smtClean="0"/>
+              <a:t>Paper Wallet</a:t>
+            </a:r>
+            <a:endParaRPr lang="en-IN" dirty="0"/>
+          </a:p>
+          <a:p>
+            <a:endParaRPr lang="en-IN" dirty="0"/>
+          </a:p>
+        </p:txBody>
+      </p:sp>
+    </p:spTree>
+    <p:extLst>
+      <p:ext uri="{BB962C8B-B14F-4D97-AF65-F5344CB8AC3E}">
+        <p14:creationId xmlns:p14="http://schemas.microsoft.com/office/powerpoint/2010/main" val="3817327775"/>
+      </p:ext>
+    </p:extLst>
+  </p:cSld>
+  <p:clrMapOvr>
+    <a:masterClrMapping/>
+  </p:clrMapOvr>
+  <mc:AlternateContent xmlns:mc="http://schemas.openxmlformats.org/markup-compatibility/2006" xmlns:p14="http://schemas.microsoft.com/office/powerpoint/2010/main">
+    <mc:Choice Requires="p14">
+      <p:transition spd="slow" p14:dur="2000"/>
+    </mc:Choice>
+    <mc:Fallback xmlns="">
+      <p:transition spd="slow"/>
+    </mc:Fallback>
+  </mc:AlternateContent>
+</p:sld>
+</file>
+
+<file path=ppt/slides/slide13.xml><?xml version="1.0" encoding="utf-8"?>
+<p:sld xmlns:a="http://schemas.openxmlformats.org/drawingml/2006/main" xmlns:r="http://schemas.openxmlformats.org/officeDocument/2006/relationships" xmlns:p="http://schemas.openxmlformats.org/presentationml/2006/main">
+  <p:cSld>
+    <p:spTree>
+      <p:nvGrpSpPr>
+        <p:cNvPr id="1" name=""/>
+        <p:cNvGrpSpPr/>
+        <p:nvPr/>
+      </p:nvGrpSpPr>
+      <p:grpSpPr>
+        <a:xfrm>
+          <a:off x="0" y="0"/>
+          <a:ext cx="0" cy="0"/>
+          <a:chOff x="0" y="0"/>
+          <a:chExt cx="0" cy="0"/>
+        </a:xfrm>
+      </p:grpSpPr>
+      <p:sp>
+        <p:nvSpPr>
+          <p:cNvPr id="4" name="Title 3"/>
+          <p:cNvSpPr>
+            <a:spLocks noGrp="1"/>
+          </p:cNvSpPr>
+          <p:nvPr>
+            <p:ph type="title"/>
+          </p:nvPr>
+        </p:nvSpPr>
+        <p:spPr/>
+        <p:txBody>
+          <a:bodyPr/>
+          <a:lstStyle/>
+          <a:p>
+            <a:r>
+              <a:rPr lang="en-IN" dirty="0" smtClean="0"/>
+              <a:t>Risks and Opportunities of using bit coin</a:t>
+            </a:r>
+            <a:endParaRPr lang="en-IN" dirty="0"/>
+          </a:p>
+        </p:txBody>
+      </p:sp>
+      <p:sp>
+        <p:nvSpPr>
+          <p:cNvPr id="5" name="TextBox 4"/>
+          <p:cNvSpPr txBox="1"/>
+          <p:nvPr/>
+        </p:nvSpPr>
+        <p:spPr>
+          <a:xfrm>
+            <a:off x="595615" y="2132856"/>
+            <a:ext cx="8136904" cy="2154436"/>
+          </a:xfrm>
+          <a:prstGeom prst="rect">
+            <a:avLst/>
+          </a:prstGeom>
+          <a:noFill/>
+        </p:spPr>
+        <p:txBody>
+          <a:bodyPr wrap="square" rtlCol="0">
+            <a:spAutoFit/>
+          </a:bodyPr>
+          <a:lstStyle/>
+          <a:p>
+            <a:r>
+              <a:rPr lang="en-IN" dirty="0" smtClean="0"/>
+              <a:t>Opportunities:</a:t>
+            </a:r>
+          </a:p>
+          <a:p>
+            <a:pPr marL="285750" indent="-285750">
+              <a:buFont typeface="Arial" panose="020B0604020202020204" pitchFamily="34" charset="0"/>
+              <a:buChar char="•"/>
+            </a:pPr>
+            <a:r>
+              <a:rPr lang="en-IN" sz="1400" dirty="0" err="1" smtClean="0"/>
+              <a:t>Bitcoin</a:t>
+            </a:r>
+            <a:r>
+              <a:rPr lang="en-IN" sz="1400" dirty="0" smtClean="0"/>
+              <a:t> still the dominate </a:t>
+            </a:r>
+            <a:r>
+              <a:rPr lang="en-IN" sz="1400" dirty="0" err="1" smtClean="0"/>
+              <a:t>cryptocurancy</a:t>
+            </a:r>
+            <a:r>
+              <a:rPr lang="en-IN" sz="1400" dirty="0" smtClean="0"/>
+              <a:t> in the world.</a:t>
+            </a:r>
+          </a:p>
+          <a:p>
+            <a:pPr marL="285750" indent="-285750">
+              <a:buFont typeface="Arial" panose="020B0604020202020204" pitchFamily="34" charset="0"/>
+              <a:buChar char="•"/>
+            </a:pPr>
+            <a:r>
+              <a:rPr lang="en-IN" sz="1400" dirty="0" smtClean="0"/>
+              <a:t>Every world currency can be exchanged with </a:t>
+            </a:r>
+            <a:r>
+              <a:rPr lang="en-IN" sz="1400" dirty="0" err="1" smtClean="0"/>
+              <a:t>bitcoin</a:t>
+            </a:r>
+            <a:endParaRPr lang="en-IN" sz="1400" dirty="0" smtClean="0"/>
+          </a:p>
+          <a:p>
+            <a:pPr marL="285750" indent="-285750">
+              <a:buFont typeface="Arial" panose="020B0604020202020204" pitchFamily="34" charset="0"/>
+              <a:buChar char="•"/>
+            </a:pPr>
+            <a:r>
+              <a:rPr lang="en-IN" sz="1400" dirty="0" smtClean="0"/>
+              <a:t>It is decentralize so no government can interfere so </a:t>
+            </a:r>
+            <a:r>
+              <a:rPr lang="en-IN" sz="1400" dirty="0" err="1" smtClean="0"/>
+              <a:t>bitcoins</a:t>
+            </a:r>
+            <a:r>
+              <a:rPr lang="en-IN" sz="1400" dirty="0" smtClean="0"/>
+              <a:t> is durable as it will not effected by recession of fiat money no demonetisation fear . </a:t>
+            </a:r>
+          </a:p>
+          <a:p>
+            <a:pPr marL="285750" indent="-285750">
+              <a:buFont typeface="Arial" panose="020B0604020202020204" pitchFamily="34" charset="0"/>
+              <a:buChar char="•"/>
+            </a:pPr>
+            <a:r>
+              <a:rPr lang="en-IN" sz="1400" dirty="0" smtClean="0"/>
+              <a:t>There is limit on how many </a:t>
+            </a:r>
+            <a:r>
+              <a:rPr lang="en-IN" sz="1400" dirty="0" err="1" smtClean="0"/>
+              <a:t>bitcoin</a:t>
+            </a:r>
+            <a:r>
+              <a:rPr lang="en-IN" sz="1400" dirty="0" smtClean="0"/>
+              <a:t> can be in circulation so the currency </a:t>
+            </a:r>
+            <a:r>
+              <a:rPr lang="en-IN" sz="1400" dirty="0"/>
+              <a:t>is </a:t>
+            </a:r>
+            <a:r>
+              <a:rPr lang="en-IN" sz="1400" dirty="0" smtClean="0"/>
+              <a:t>deflationary so value of </a:t>
+            </a:r>
+            <a:r>
+              <a:rPr lang="en-IN" sz="1400" dirty="0" err="1" smtClean="0"/>
+              <a:t>bitcoin</a:t>
+            </a:r>
+            <a:r>
+              <a:rPr lang="en-IN" sz="1400" dirty="0" smtClean="0"/>
+              <a:t> will increase overtime so good for investment</a:t>
+            </a:r>
+          </a:p>
+          <a:p>
+            <a:pPr marL="285750" indent="-285750">
+              <a:buFont typeface="Arial" panose="020B0604020202020204" pitchFamily="34" charset="0"/>
+              <a:buChar char="•"/>
+            </a:pPr>
+            <a:r>
+              <a:rPr lang="en-IN" sz="1400" dirty="0" smtClean="0"/>
+              <a:t>As there is no intermediate third party so transaction fees are low </a:t>
+            </a:r>
+          </a:p>
+          <a:p>
+            <a:pPr marL="285750" indent="-285750">
+              <a:buFont typeface="Arial" panose="020B0604020202020204" pitchFamily="34" charset="0"/>
+              <a:buChar char="•"/>
+            </a:pPr>
+            <a:endParaRPr lang="en-IN" dirty="0"/>
+          </a:p>
+        </p:txBody>
+      </p:sp>
+      <p:sp>
+        <p:nvSpPr>
+          <p:cNvPr id="6" name="TextBox 5"/>
+          <p:cNvSpPr txBox="1"/>
+          <p:nvPr/>
+        </p:nvSpPr>
+        <p:spPr>
+          <a:xfrm>
+            <a:off x="683568" y="1196752"/>
+            <a:ext cx="7042312" cy="1015663"/>
+          </a:xfrm>
+          <a:prstGeom prst="rect">
+            <a:avLst/>
+          </a:prstGeom>
+          <a:noFill/>
+        </p:spPr>
+        <p:txBody>
+          <a:bodyPr wrap="none" rtlCol="0">
+            <a:spAutoFit/>
+          </a:bodyPr>
+          <a:lstStyle/>
+          <a:p>
+            <a:r>
+              <a:rPr lang="en-IN" sz="1400" dirty="0"/>
+              <a:t>People are using </a:t>
+            </a:r>
+            <a:r>
+              <a:rPr lang="en-IN" sz="1400" dirty="0" err="1"/>
+              <a:t>Bitcoin</a:t>
+            </a:r>
+            <a:r>
+              <a:rPr lang="en-IN" sz="1400" dirty="0"/>
+              <a:t> for </a:t>
+            </a:r>
+            <a:r>
+              <a:rPr lang="en-IN" sz="1400" dirty="0" smtClean="0"/>
+              <a:t>speculative trading that makes its value very volatile. </a:t>
+            </a:r>
+            <a:br>
+              <a:rPr lang="en-IN" sz="1400" dirty="0" smtClean="0"/>
+            </a:br>
+            <a:r>
+              <a:rPr lang="en-IN" sz="1400" dirty="0" err="1" smtClean="0"/>
+              <a:t>Bitcoin</a:t>
+            </a:r>
+            <a:r>
+              <a:rPr lang="en-IN" sz="1400" dirty="0" smtClean="0"/>
+              <a:t> is so volatile that it cant be used to by and sell merchandise so it is not fulfilling </a:t>
+            </a:r>
+          </a:p>
+          <a:p>
+            <a:r>
+              <a:rPr lang="en-IN" sz="1400" dirty="0" smtClean="0"/>
+              <a:t>The purpose for which it was created.</a:t>
+            </a:r>
+          </a:p>
+          <a:p>
+            <a:endParaRPr lang="en-IN" dirty="0"/>
+          </a:p>
+        </p:txBody>
+      </p:sp>
+      <p:sp>
+        <p:nvSpPr>
+          <p:cNvPr id="7" name="TextBox 6"/>
+          <p:cNvSpPr txBox="1"/>
+          <p:nvPr/>
+        </p:nvSpPr>
+        <p:spPr>
+          <a:xfrm>
+            <a:off x="614444" y="4146178"/>
+            <a:ext cx="8136904" cy="2154436"/>
+          </a:xfrm>
+          <a:prstGeom prst="rect">
+            <a:avLst/>
+          </a:prstGeom>
+          <a:noFill/>
+        </p:spPr>
+        <p:txBody>
+          <a:bodyPr wrap="square" rtlCol="0">
+            <a:spAutoFit/>
+          </a:bodyPr>
+          <a:lstStyle/>
+          <a:p>
+            <a:r>
+              <a:rPr lang="en-IN" dirty="0" smtClean="0"/>
+              <a:t>Risks:</a:t>
+            </a:r>
+          </a:p>
+          <a:p>
+            <a:pPr marL="285750" indent="-285750">
+              <a:buFont typeface="Arial" panose="020B0604020202020204" pitchFamily="34" charset="0"/>
+              <a:buChar char="•"/>
+            </a:pPr>
+            <a:r>
+              <a:rPr lang="en-IN" sz="1400" dirty="0" err="1" smtClean="0"/>
+              <a:t>Bitcoin</a:t>
+            </a:r>
+            <a:r>
+              <a:rPr lang="en-IN" sz="1400" dirty="0" smtClean="0"/>
+              <a:t> is not backed by government or any asset. So if some body steal the </a:t>
+            </a:r>
+            <a:r>
+              <a:rPr lang="en-IN" sz="1400" dirty="0" err="1" smtClean="0"/>
+              <a:t>bitcoins</a:t>
+            </a:r>
+            <a:r>
+              <a:rPr lang="en-IN" sz="1400" dirty="0" smtClean="0"/>
+              <a:t> or some </a:t>
+            </a:r>
+            <a:r>
+              <a:rPr lang="en-IN" sz="1400" dirty="0" err="1" smtClean="0"/>
+              <a:t>bitcoin</a:t>
+            </a:r>
+            <a:r>
+              <a:rPr lang="en-IN" sz="1400" dirty="0" smtClean="0"/>
+              <a:t> exchange take away the user </a:t>
+            </a:r>
+            <a:r>
+              <a:rPr lang="en-IN" sz="1400" dirty="0" err="1" smtClean="0"/>
+              <a:t>bicoin</a:t>
+            </a:r>
+            <a:r>
+              <a:rPr lang="en-IN" sz="1400" dirty="0" smtClean="0"/>
+              <a:t> there is no one to protect buyers</a:t>
+            </a:r>
+          </a:p>
+          <a:p>
+            <a:pPr marL="285750" indent="-285750">
+              <a:buFont typeface="Arial" panose="020B0604020202020204" pitchFamily="34" charset="0"/>
+              <a:buChar char="•"/>
+            </a:pPr>
+            <a:r>
+              <a:rPr lang="en-IN" sz="1400" dirty="0" err="1" smtClean="0"/>
+              <a:t>Bitcoin</a:t>
+            </a:r>
+            <a:r>
+              <a:rPr lang="en-IN" sz="1400" dirty="0" smtClean="0"/>
+              <a:t> has value because every byers thinks the bit coin going to work and it is subjected to media coverage , if these </a:t>
+            </a:r>
+            <a:r>
+              <a:rPr lang="en-IN" sz="1400" dirty="0" err="1" smtClean="0"/>
+              <a:t>belefe</a:t>
+            </a:r>
+            <a:r>
+              <a:rPr lang="en-IN" sz="1400" dirty="0" smtClean="0"/>
+              <a:t> get shaken then the price of </a:t>
+            </a:r>
+            <a:r>
+              <a:rPr lang="en-IN" sz="1400" dirty="0" err="1" smtClean="0"/>
+              <a:t>bitcoin</a:t>
+            </a:r>
+            <a:r>
+              <a:rPr lang="en-IN" sz="1400" dirty="0" smtClean="0"/>
+              <a:t> will fall sharply </a:t>
+            </a:r>
+          </a:p>
+          <a:p>
+            <a:pPr marL="285750" indent="-285750">
+              <a:buFont typeface="Arial" panose="020B0604020202020204" pitchFamily="34" charset="0"/>
+              <a:buChar char="•"/>
+            </a:pPr>
+            <a:r>
+              <a:rPr lang="en-IN" sz="1400" dirty="0" err="1" smtClean="0"/>
+              <a:t>Bitcoin</a:t>
+            </a:r>
+            <a:r>
+              <a:rPr lang="en-IN" sz="1400" dirty="0" smtClean="0"/>
+              <a:t> is a threat to </a:t>
+            </a:r>
+            <a:r>
+              <a:rPr lang="en-IN" sz="1400" dirty="0" err="1" smtClean="0"/>
+              <a:t>govment</a:t>
+            </a:r>
+            <a:r>
+              <a:rPr lang="en-IN" sz="1400" dirty="0" smtClean="0"/>
+              <a:t> as </a:t>
+            </a:r>
+            <a:r>
+              <a:rPr lang="en-IN" sz="1400" dirty="0" err="1" smtClean="0"/>
+              <a:t>goverment</a:t>
+            </a:r>
+            <a:r>
+              <a:rPr lang="en-IN" sz="1400" dirty="0" smtClean="0"/>
+              <a:t> loose control over its money so government will try to regulate its use and it will effect the value of </a:t>
+            </a:r>
+            <a:r>
+              <a:rPr lang="en-IN" sz="1400" dirty="0" err="1" smtClean="0"/>
+              <a:t>bitcoin</a:t>
+            </a:r>
+            <a:r>
+              <a:rPr lang="en-IN" sz="1400" dirty="0" smtClean="0"/>
+              <a:t>  . </a:t>
+            </a:r>
+          </a:p>
+          <a:p>
+            <a:pPr marL="285750" indent="-285750">
+              <a:buFont typeface="Arial" panose="020B0604020202020204" pitchFamily="34" charset="0"/>
+              <a:buChar char="•"/>
+            </a:pPr>
+            <a:r>
+              <a:rPr lang="en-IN" sz="1400" dirty="0" smtClean="0"/>
+              <a:t> </a:t>
+            </a:r>
+          </a:p>
+          <a:p>
+            <a:pPr marL="285750" indent="-285750">
+              <a:buFont typeface="Arial" panose="020B0604020202020204" pitchFamily="34" charset="0"/>
+              <a:buChar char="•"/>
+            </a:pPr>
+            <a:endParaRPr lang="en-IN" dirty="0"/>
+          </a:p>
+        </p:txBody>
+      </p:sp>
+    </p:spTree>
+    <p:extLst>
+      <p:ext uri="{BB962C8B-B14F-4D97-AF65-F5344CB8AC3E}">
+        <p14:creationId xmlns:p14="http://schemas.microsoft.com/office/powerpoint/2010/main" val="3532754272"/>
+      </p:ext>
+    </p:extLst>
+  </p:cSld>
+  <p:clrMapOvr>
+    <a:masterClrMapping/>
+  </p:clrMapOvr>
+  <mc:AlternateContent xmlns:mc="http://schemas.openxmlformats.org/markup-compatibility/2006" xmlns:p14="http://schemas.microsoft.com/office/powerpoint/2010/main">
+    <mc:Choice Requires="p14">
+      <p:transition spd="slow" p14:dur="2000"/>
+    </mc:Choice>
+    <mc:Fallback xmlns="">
+      <p:transition spd="slow"/>
+    </mc:Fallback>
+  </mc:AlternateContent>
+</p:sld>
+</file>
+
+<file path=ppt/slides/slide14.xml><?xml version="1.0" encoding="utf-8"?>
+<p:sld xmlns:a="http://schemas.openxmlformats.org/drawingml/2006/main" xmlns:r="http://schemas.openxmlformats.org/officeDocument/2006/relationships" xmlns:p="http://schemas.openxmlformats.org/presentationml/2006/main">
+  <p:cSld>
+    <p:spTree>
+      <p:nvGrpSpPr>
+        <p:cNvPr id="1" name=""/>
+        <p:cNvGrpSpPr/>
+        <p:nvPr/>
+      </p:nvGrpSpPr>
+      <p:grpSpPr>
+        <a:xfrm>
+          <a:off x="0" y="0"/>
+          <a:ext cx="0" cy="0"/>
+          <a:chOff x="0" y="0"/>
+          <a:chExt cx="0" cy="0"/>
+        </a:xfrm>
+      </p:grpSpPr>
+      <p:sp>
+        <p:nvSpPr>
+          <p:cNvPr id="4" name="Title 3"/>
+          <p:cNvSpPr>
+            <a:spLocks noGrp="1"/>
+          </p:cNvSpPr>
+          <p:nvPr>
+            <p:ph type="title"/>
+          </p:nvPr>
+        </p:nvSpPr>
+        <p:spPr/>
+        <p:txBody>
+          <a:bodyPr/>
+          <a:lstStyle/>
+          <a:p>
+            <a:r>
+              <a:rPr lang="en-IN" dirty="0" smtClean="0"/>
+              <a:t>Other </a:t>
+            </a:r>
+            <a:r>
+              <a:rPr lang="en-IN" dirty="0" err="1" smtClean="0"/>
+              <a:t>Cryptocurecies</a:t>
+            </a:r>
+            <a:endParaRPr lang="en-IN" dirty="0"/>
+          </a:p>
+        </p:txBody>
+      </p:sp>
+      <p:pic>
+        <p:nvPicPr>
+          <p:cNvPr id="5" name="Picture 4"/>
+          <p:cNvPicPr>
+            <a:picLocks noChangeAspect="1"/>
+          </p:cNvPicPr>
+          <p:nvPr/>
+        </p:nvPicPr>
+        <p:blipFill>
+          <a:blip r:embed="rId2">
+            <a:extLst>
+              <a:ext uri="{28A0092B-C50C-407E-A947-70E740481C1C}">
+                <a14:useLocalDpi xmlns:a14="http://schemas.microsoft.com/office/drawing/2010/main" val="0"/>
+              </a:ext>
+            </a:extLst>
+          </a:blip>
+          <a:stretch>
+            <a:fillRect/>
+          </a:stretch>
+        </p:blipFill>
+        <p:spPr>
+          <a:xfrm>
+            <a:off x="0" y="1134224"/>
+            <a:ext cx="9144000" cy="4589551"/>
+          </a:xfrm>
+          <a:prstGeom prst="rect">
+            <a:avLst/>
+          </a:prstGeom>
+        </p:spPr>
+      </p:pic>
+    </p:spTree>
+    <p:extLst>
+      <p:ext uri="{BB962C8B-B14F-4D97-AF65-F5344CB8AC3E}">
+        <p14:creationId xmlns:p14="http://schemas.microsoft.com/office/powerpoint/2010/main" val="459049882"/>
+      </p:ext>
+    </p:extLst>
+  </p:cSld>
+  <p:clrMapOvr>
+    <a:masterClrMapping/>
+  </p:clrMapOvr>
+  <mc:AlternateContent xmlns:mc="http://schemas.openxmlformats.org/markup-compatibility/2006" xmlns:p14="http://schemas.microsoft.com/office/powerpoint/2010/main">
+    <mc:Choice Requires="p14">
+      <p:transition spd="slow" p14:dur="2000"/>
+    </mc:Choice>
+    <mc:Fallback xmlns="">
+      <p:transition spd="slow"/>
+    </mc:Fallback>
+  </mc:AlternateContent>
+</p:sld>
+</file>
+
+<file path=ppt/slides/slide15.xml><?xml version="1.0" encoding="utf-8"?>
 <p:sld xmlns:a="http://schemas.openxmlformats.org/drawingml/2006/main" xmlns:r="http://schemas.openxmlformats.org/officeDocument/2006/relationships" xmlns:p="http://schemas.openxmlformats.org/presentationml/2006/main">
   <p:cSld>
     <p:spTree>
@@ -4851,7 +5174,7 @@
         </p:nvSpPr>
         <p:spPr>
           <a:xfrm>
-            <a:off x="539552" y="2348880"/>
+            <a:off x="395536" y="260648"/>
             <a:ext cx="7888288" cy="864096"/>
           </a:xfrm>
         </p:spPr>
@@ -4862,9 +5185,170 @@
             <a:pPr algn="ctr"/>
             <a:r>
               <a:rPr lang="en-US" dirty="0" smtClean="0"/>
-              <a:t>Currency 101</a:t>
+              <a:t>Agenda Of The Day</a:t>
             </a:r>
             <a:endParaRPr lang="en-US" dirty="0"/>
+          </a:p>
+        </p:txBody>
+      </p:sp>
+      <p:sp>
+        <p:nvSpPr>
+          <p:cNvPr id="3" name="TextBox 2"/>
+          <p:cNvSpPr txBox="1"/>
+          <p:nvPr/>
+        </p:nvSpPr>
+        <p:spPr>
+          <a:xfrm>
+            <a:off x="611560" y="2204864"/>
+            <a:ext cx="8352928" cy="2308324"/>
+          </a:xfrm>
+          <a:prstGeom prst="rect">
+            <a:avLst/>
+          </a:prstGeom>
+          <a:noFill/>
+        </p:spPr>
+        <p:txBody>
+          <a:bodyPr wrap="square" rtlCol="0">
+            <a:spAutoFit/>
+          </a:bodyPr>
+          <a:lstStyle/>
+          <a:p>
+            <a:pPr marL="342900" indent="-342900">
+              <a:buFont typeface="+mj-lt"/>
+              <a:buAutoNum type="arabicPeriod"/>
+            </a:pPr>
+            <a:r>
+              <a:rPr lang="en-IN" dirty="0"/>
+              <a:t>C</a:t>
+            </a:r>
+            <a:r>
+              <a:rPr lang="en-IN" dirty="0" smtClean="0"/>
+              <a:t>urrency 101</a:t>
+            </a:r>
+          </a:p>
+          <a:p>
+            <a:pPr marL="342900" indent="-342900">
+              <a:buFont typeface="+mj-lt"/>
+              <a:buAutoNum type="arabicPeriod"/>
+            </a:pPr>
+            <a:r>
+              <a:rPr lang="en-IN" dirty="0" smtClean="0"/>
+              <a:t>Brief Interdiction to </a:t>
+            </a:r>
+            <a:r>
+              <a:rPr lang="en-IN" dirty="0" err="1" smtClean="0"/>
+              <a:t>bitcoin</a:t>
+            </a:r>
+            <a:r>
+              <a:rPr lang="en-IN" dirty="0" smtClean="0"/>
+              <a:t> </a:t>
+            </a:r>
+          </a:p>
+          <a:p>
+            <a:pPr marL="342900" indent="-342900">
+              <a:buFont typeface="+mj-lt"/>
+              <a:buAutoNum type="arabicPeriod"/>
+            </a:pPr>
+            <a:r>
+              <a:rPr lang="en-IN" dirty="0" smtClean="0"/>
+              <a:t>How </a:t>
+            </a:r>
+            <a:r>
+              <a:rPr lang="en-IN" dirty="0"/>
+              <a:t>to buy and sell </a:t>
+            </a:r>
+            <a:r>
+              <a:rPr lang="en-IN" dirty="0" err="1" smtClean="0"/>
+              <a:t>bitcoin</a:t>
+            </a:r>
+            <a:r>
+              <a:rPr lang="en-IN" dirty="0" smtClean="0"/>
+              <a:t>.</a:t>
+            </a:r>
+          </a:p>
+          <a:p>
+            <a:pPr marL="342900" indent="-342900">
+              <a:buFont typeface="+mj-lt"/>
+              <a:buAutoNum type="arabicPeriod"/>
+            </a:pPr>
+            <a:r>
+              <a:rPr lang="en-IN" dirty="0"/>
+              <a:t>how </a:t>
+            </a:r>
+            <a:r>
+              <a:rPr lang="en-IN" dirty="0" err="1"/>
+              <a:t>bitcoin</a:t>
+            </a:r>
+            <a:r>
+              <a:rPr lang="en-IN" dirty="0" smtClean="0"/>
+              <a:t> </a:t>
+            </a:r>
+            <a:r>
+              <a:rPr lang="en-IN" dirty="0"/>
+              <a:t>works</a:t>
+            </a:r>
+            <a:r>
+              <a:rPr lang="en-IN" dirty="0" smtClean="0"/>
+              <a:t>.</a:t>
+            </a:r>
+          </a:p>
+          <a:p>
+            <a:pPr marL="342900" indent="-342900">
+              <a:buFont typeface="+mj-lt"/>
+              <a:buAutoNum type="arabicPeriod"/>
+            </a:pPr>
+            <a:r>
+              <a:rPr lang="en-IN" dirty="0" smtClean="0"/>
+              <a:t>Risks and Opportunities of using </a:t>
+            </a:r>
+            <a:r>
+              <a:rPr lang="en-IN" dirty="0" err="1" smtClean="0"/>
+              <a:t>Bitcoin</a:t>
+            </a:r>
+            <a:r>
+              <a:rPr lang="en-IN" dirty="0" smtClean="0"/>
+              <a:t>.</a:t>
+            </a:r>
+          </a:p>
+          <a:p>
+            <a:pPr marL="342900" indent="-342900">
+              <a:buFont typeface="+mj-lt"/>
+              <a:buAutoNum type="arabicPeriod"/>
+            </a:pPr>
+            <a:r>
+              <a:rPr lang="en-IN" dirty="0" smtClean="0"/>
+              <a:t>Discuss other </a:t>
+            </a:r>
+            <a:r>
+              <a:rPr lang="en-IN" dirty="0" err="1" smtClean="0"/>
+              <a:t>cryptocurrencies</a:t>
+            </a:r>
+            <a:r>
+              <a:rPr lang="en-IN" dirty="0" smtClean="0"/>
+              <a:t> (</a:t>
+            </a:r>
+            <a:r>
+              <a:rPr lang="en-IN" dirty="0" err="1" smtClean="0"/>
+              <a:t>litcoin,etc</a:t>
+            </a:r>
+            <a:r>
+              <a:rPr lang="en-IN" dirty="0" smtClean="0"/>
+              <a:t>) </a:t>
+            </a:r>
+          </a:p>
+          <a:p>
+            <a:pPr marL="342900" indent="-342900">
+              <a:buFont typeface="+mj-lt"/>
+              <a:buAutoNum type="arabicPeriod"/>
+            </a:pPr>
+            <a:endParaRPr lang="en-IN" dirty="0" smtClean="0"/>
+          </a:p>
+          <a:p>
+            <a:pPr marL="342900" indent="-342900">
+              <a:buFont typeface="+mj-lt"/>
+              <a:buAutoNum type="arabicPeriod"/>
+            </a:pPr>
+            <a:endParaRPr lang="en-IN" dirty="0"/>
           </a:p>
         </p:txBody>
       </p:sp>
@@ -4914,9 +5398,12 @@
           <a:lstStyle/>
           <a:p>
             <a:r>
-              <a:rPr lang="en-US" dirty="0" smtClean="0"/>
-              <a:t>What is currency?</a:t>
-            </a:r>
+              <a:rPr lang="en-IN" dirty="0"/>
+              <a:t>Currency 101</a:t>
+            </a:r>
+            <a:br>
+              <a:rPr lang="en-IN" dirty="0"/>
+            </a:br>
             <a:endParaRPr lang="en-US" dirty="0"/>
           </a:p>
         </p:txBody>
@@ -4929,7 +5416,7 @@
         </p:nvSpPr>
         <p:spPr>
           <a:xfrm>
-            <a:off x="329184" y="787400"/>
+            <a:off x="329184" y="1408990"/>
             <a:ext cx="4493538" cy="369332"/>
           </a:xfrm>
           <a:prstGeom prst="rect">
@@ -5024,7 +5511,7 @@
         </p:blipFill>
         <p:spPr>
           <a:xfrm>
-            <a:off x="2843808" y="1309623"/>
+            <a:off x="2756548" y="2062741"/>
             <a:ext cx="1795016" cy="1801920"/>
           </a:xfrm>
           <a:prstGeom prst="rect">
@@ -5032,6 +5519,36 @@
           </a:prstGeom>
         </p:spPr>
       </p:pic>
+      <p:sp>
+        <p:nvSpPr>
+          <p:cNvPr id="3" name="TextBox 2"/>
+          <p:cNvSpPr txBox="1"/>
+          <p:nvPr/>
+        </p:nvSpPr>
+        <p:spPr>
+          <a:xfrm>
+            <a:off x="329184" y="1071610"/>
+            <a:ext cx="2149044" cy="369332"/>
+          </a:xfrm>
+          <a:prstGeom prst="rect">
+            <a:avLst/>
+          </a:prstGeom>
+          <a:noFill/>
+        </p:spPr>
+        <p:txBody>
+          <a:bodyPr wrap="square" rtlCol="0">
+            <a:spAutoFit/>
+          </a:bodyPr>
+          <a:lstStyle/>
+          <a:p>
+            <a:r>
+              <a:rPr lang="en-US" dirty="0"/>
+              <a:t>What is currency?</a:t>
+            </a:r>
+            <a:endParaRPr lang="en-IN" dirty="0"/>
+          </a:p>
+        </p:txBody>
+      </p:sp>
     </p:spTree>
     <p:extLst>
       <p:ext uri="{BB962C8B-B14F-4D97-AF65-F5344CB8AC3E}">
@@ -5072,78 +5589,232 @@
             <p:ph type="title"/>
           </p:nvPr>
         </p:nvSpPr>
-        <p:spPr/>
+        <p:spPr>
+          <a:xfrm>
+            <a:off x="255286" y="2567276"/>
+            <a:ext cx="8712968" cy="719156"/>
+          </a:xfrm>
+        </p:spPr>
         <p:txBody>
           <a:bodyPr/>
           <a:lstStyle/>
           <a:p>
             <a:r>
-              <a:rPr lang="en-IN" dirty="0"/>
-              <a:t>Digital </a:t>
-            </a:r>
-            <a:r>
-              <a:rPr lang="en-IN" dirty="0" smtClean="0"/>
-              <a:t>Currency</a:t>
-            </a:r>
-            <a:r>
-              <a:rPr lang="en-US" dirty="0" smtClean="0"/>
-              <a:t>:  </a:t>
-            </a:r>
-            <a:endParaRPr lang="en-US" dirty="0"/>
-          </a:p>
-        </p:txBody>
-      </p:sp>
-      <p:sp>
-        <p:nvSpPr>
-          <p:cNvPr id="3" name="Content Placeholder 2"/>
-          <p:cNvSpPr>
-            <a:spLocks noGrp="1"/>
+              <a:rPr lang="en-IN" sz="1800" b="1" dirty="0" smtClean="0"/>
+              <a:t>Digital Currency</a:t>
+            </a:r>
+            <a:r>
+              <a:rPr lang="en-US" sz="1800" b="1" dirty="0" smtClean="0"/>
+              <a:t>: </a:t>
+            </a:r>
+            <a:r>
+              <a:rPr lang="en-US" sz="1800" dirty="0" smtClean="0"/>
+              <a:t/>
+            </a:r>
+            <a:br>
+              <a:rPr lang="en-US" sz="1800" dirty="0" smtClean="0"/>
+            </a:br>
+            <a:r>
+              <a:rPr lang="en-IN" sz="1400" dirty="0" smtClean="0"/>
+              <a:t>This is the currency only available in digital form. It may backed by a physical currency.</a:t>
+            </a:r>
+            <a:br>
+              <a:rPr lang="en-IN" sz="1400" dirty="0" smtClean="0"/>
+            </a:br>
+            <a:r>
+              <a:rPr lang="en-US" sz="1800" dirty="0" smtClean="0"/>
+              <a:t> </a:t>
+            </a:r>
+            <a:endParaRPr lang="en-US" sz="1800" dirty="0"/>
+          </a:p>
+        </p:txBody>
+      </p:sp>
+      <p:sp>
+        <p:nvSpPr>
+          <p:cNvPr id="9" name="TextBox 8"/>
+          <p:cNvSpPr txBox="1"/>
+          <p:nvPr/>
+        </p:nvSpPr>
+        <p:spPr>
+          <a:xfrm>
+            <a:off x="395536" y="5554936"/>
+            <a:ext cx="7557965" cy="800219"/>
+          </a:xfrm>
+          <a:prstGeom prst="rect">
+            <a:avLst/>
+          </a:prstGeom>
+          <a:noFill/>
+        </p:spPr>
+        <p:txBody>
+          <a:bodyPr wrap="square" rtlCol="0">
+            <a:spAutoFit/>
+          </a:bodyPr>
+          <a:lstStyle/>
+          <a:p>
+            <a:r>
+              <a:rPr lang="en-IN" b="1" dirty="0"/>
+              <a:t>Crypto </a:t>
+            </a:r>
+            <a:r>
+              <a:rPr lang="en-IN" b="1" dirty="0" smtClean="0"/>
+              <a:t>currency:</a:t>
+            </a:r>
+            <a:r>
+              <a:rPr lang="en-IN" b="1" dirty="0"/>
+              <a:t/>
+            </a:r>
+            <a:br>
+              <a:rPr lang="en-IN" b="1" dirty="0"/>
+            </a:br>
+            <a:r>
+              <a:rPr lang="en-IN" sz="1400" dirty="0"/>
+              <a:t>Is </a:t>
+            </a:r>
+            <a:r>
+              <a:rPr lang="en-IN" sz="1400" dirty="0" smtClean="0"/>
+              <a:t>a kind </a:t>
+            </a:r>
+            <a:r>
+              <a:rPr lang="en-IN" sz="1400" dirty="0"/>
+              <a:t>of  </a:t>
+            </a:r>
+            <a:r>
+              <a:rPr lang="en-IN" sz="1400" dirty="0" smtClean="0"/>
+              <a:t>digital currency </a:t>
+            </a:r>
+            <a:r>
+              <a:rPr lang="en-IN" sz="1400" dirty="0"/>
+              <a:t>which use cryptography in transaction to protect the privacy and to increase security of the transaction. </a:t>
+            </a:r>
+            <a:endParaRPr lang="en-IN" sz="1400" dirty="0"/>
+          </a:p>
+        </p:txBody>
+      </p:sp>
+      <p:sp>
+        <p:nvSpPr>
+          <p:cNvPr id="12" name="Title 1"/>
+          <p:cNvSpPr txBox="1">
+            <a:spLocks/>
           </p:cNvSpPr>
-          <p:nvPr>
-            <p:ph idx="1"/>
-          </p:nvPr>
-        </p:nvSpPr>
-        <p:spPr>
-          <a:xfrm>
-            <a:off x="329184" y="1234439"/>
-            <a:ext cx="8403336" cy="610385"/>
-          </a:xfrm>
+          <p:nvPr/>
+        </p:nvSpPr>
+        <p:spPr>
+          <a:xfrm>
+            <a:off x="251520" y="3251974"/>
+            <a:ext cx="8712968" cy="2302962"/>
+          </a:xfrm>
+          <a:prstGeom prst="rect">
+            <a:avLst/>
+          </a:prstGeom>
         </p:spPr>
         <p:txBody>
           <a:bodyPr/>
-          <a:lstStyle/>
-          <a:p>
-            <a:pPr marL="0" indent="0">
+          <a:lstStyle>
+            <a:lvl1pPr algn="l" defTabSz="914400" rtl="0" eaLnBrk="1" latinLnBrk="0" hangingPunct="1">
+              <a:spcBef>
+                <a:spcPct val="0"/>
+              </a:spcBef>
               <a:buNone/>
+              <a:defRPr lang="en-US" sz="2400" kern="1200" dirty="0">
+                <a:solidFill>
+                  <a:schemeClr val="tx1"/>
+                </a:solidFill>
+                <a:latin typeface="+mj-lt"/>
+                <a:ea typeface="+mn-ea"/>
+                <a:cs typeface="Helvetica" panose="020B0604020202020204" pitchFamily="34" charset="0"/>
+              </a:defRPr>
+            </a:lvl1pPr>
+          </a:lstStyle>
+          <a:p>
+            <a:r>
+              <a:rPr lang="en-IN" sz="1800" b="1" dirty="0" smtClean="0"/>
+              <a:t>Virtual Currency:</a:t>
+            </a:r>
+            <a:r>
+              <a:rPr lang="en-IN" sz="1800" dirty="0" smtClean="0"/>
+              <a:t> </a:t>
+            </a:r>
+            <a:br>
+              <a:rPr lang="en-IN" sz="1800" dirty="0" smtClean="0"/>
+            </a:br>
+            <a:r>
+              <a:rPr lang="en-IN" sz="1400" dirty="0" smtClean="0"/>
+              <a:t>This special type of digital currency which is created by online community for their use. </a:t>
+            </a:r>
+            <a:br>
+              <a:rPr lang="en-IN" sz="1400" dirty="0" smtClean="0"/>
+            </a:br>
+            <a:endParaRPr lang="en-IN" sz="1400" dirty="0" smtClean="0"/>
+          </a:p>
+          <a:p>
+            <a:r>
+              <a:rPr lang="en-IN" sz="1400" dirty="0" smtClean="0"/>
+              <a:t>Depending on wither we can used out side the community it can be categorized as </a:t>
+            </a:r>
+            <a:endParaRPr lang="en-IN" sz="1400" dirty="0"/>
+          </a:p>
+          <a:p>
+            <a:pPr marL="285750" indent="-285750">
+              <a:buFont typeface="Arial" panose="020B0604020202020204" pitchFamily="34" charset="0"/>
+              <a:buChar char="•"/>
             </a:pPr>
             <a:r>
-              <a:rPr lang="en-US" dirty="0" smtClean="0"/>
-              <a:t>This is the currency only available in digital form ,not in physical </a:t>
-            </a:r>
-            <a:br>
-              <a:rPr lang="en-US" dirty="0" smtClean="0"/>
-            </a:br>
-            <a:r>
-              <a:rPr lang="en-US" dirty="0" smtClean="0"/>
-              <a:t/>
-            </a:r>
-            <a:br>
-              <a:rPr lang="en-US" dirty="0" smtClean="0"/>
-            </a:br>
-            <a:endParaRPr lang="en-US" dirty="0"/>
-          </a:p>
-        </p:txBody>
-      </p:sp>
-      <p:sp>
-        <p:nvSpPr>
-          <p:cNvPr id="4" name="Oval 3"/>
+              <a:rPr lang="en-IN" sz="1400" dirty="0" smtClean="0"/>
+              <a:t>Open Virtual Currency</a:t>
+            </a:r>
+          </a:p>
+          <a:p>
+            <a:pPr marL="285750" indent="-285750">
+              <a:buFont typeface="Arial" panose="020B0604020202020204" pitchFamily="34" charset="0"/>
+              <a:buChar char="•"/>
+            </a:pPr>
+            <a:r>
+              <a:rPr lang="en-IN" sz="1400" dirty="0" smtClean="0"/>
+              <a:t>Closed Virtual Currency</a:t>
+            </a:r>
+          </a:p>
+          <a:p>
+            <a:endParaRPr lang="en-IN" sz="1400" dirty="0"/>
+          </a:p>
+          <a:p>
+            <a:r>
+              <a:rPr lang="en-IN" sz="1400" dirty="0" smtClean="0"/>
+              <a:t>Depending who controls the creation and transaction of currency, there are two type of virtual currencies</a:t>
+            </a:r>
+          </a:p>
+          <a:p>
+            <a:pPr marL="285750" indent="-285750">
+              <a:buFont typeface="Arial" panose="020B0604020202020204" pitchFamily="34" charset="0"/>
+              <a:buChar char="•"/>
+            </a:pPr>
+            <a:r>
+              <a:rPr lang="en-IN" sz="1400" dirty="0" smtClean="0"/>
+              <a:t>Centralize  virtual currency</a:t>
+            </a:r>
+          </a:p>
+          <a:p>
+            <a:pPr marL="285750" indent="-285750">
+              <a:buFont typeface="Arial" panose="020B0604020202020204" pitchFamily="34" charset="0"/>
+              <a:buChar char="•"/>
+            </a:pPr>
+            <a:r>
+              <a:rPr lang="en-IN" sz="1400" dirty="0" smtClean="0"/>
+              <a:t>Decentralize virtual currency</a:t>
+            </a:r>
+            <a:endParaRPr lang="en-IN" sz="1400" dirty="0"/>
+          </a:p>
+        </p:txBody>
+      </p:sp>
+      <p:sp>
+        <p:nvSpPr>
+          <p:cNvPr id="13" name="Oval 12"/>
           <p:cNvSpPr/>
           <p:nvPr/>
         </p:nvSpPr>
         <p:spPr>
           <a:xfrm>
-            <a:off x="1763688" y="2132856"/>
-            <a:ext cx="4032448" cy="3456384"/>
+            <a:off x="2555777" y="87003"/>
+            <a:ext cx="2736304" cy="2364752"/>
           </a:xfrm>
           <a:prstGeom prst="ellipse">
             <a:avLst/>
@@ -5179,14 +5850,14 @@
       </p:sp>
       <p:sp>
         <p:nvSpPr>
-          <p:cNvPr id="5" name="Oval 4"/>
+          <p:cNvPr id="14" name="Oval 13"/>
           <p:cNvSpPr/>
           <p:nvPr/>
         </p:nvSpPr>
         <p:spPr>
           <a:xfrm>
-            <a:off x="2447764" y="2650170"/>
-            <a:ext cx="3168352" cy="2559282"/>
+            <a:off x="2915814" y="404664"/>
+            <a:ext cx="2016224" cy="1944215"/>
           </a:xfrm>
           <a:prstGeom prst="ellipse">
             <a:avLst/>
@@ -5222,14 +5893,14 @@
       </p:sp>
       <p:sp>
         <p:nvSpPr>
-          <p:cNvPr id="6" name="Oval 5"/>
+          <p:cNvPr id="15" name="Oval 14"/>
           <p:cNvSpPr/>
           <p:nvPr/>
         </p:nvSpPr>
         <p:spPr>
           <a:xfrm>
-            <a:off x="3095836" y="3220238"/>
-            <a:ext cx="1872208" cy="1584176"/>
+            <a:off x="3200297" y="894365"/>
+            <a:ext cx="1487074" cy="1238491"/>
           </a:xfrm>
           <a:prstGeom prst="ellipse">
             <a:avLst/>
@@ -5259,24 +5930,20 @@
           <a:lstStyle/>
           <a:p>
             <a:pPr algn="ctr"/>
-            <a:r>
-              <a:rPr lang="en-IN" dirty="0" smtClean="0"/>
-              <a:t>Crypto Currency</a:t>
-            </a:r>
             <a:endParaRPr lang="en-IN" dirty="0"/>
           </a:p>
         </p:txBody>
       </p:sp>
       <p:sp>
         <p:nvSpPr>
-          <p:cNvPr id="7" name="TextBox 6"/>
+          <p:cNvPr id="16" name="TextBox 15"/>
           <p:cNvSpPr txBox="1"/>
           <p:nvPr/>
         </p:nvSpPr>
         <p:spPr>
           <a:xfrm>
-            <a:off x="2866841" y="2280838"/>
-            <a:ext cx="1826141" cy="369332"/>
+            <a:off x="3200297" y="196436"/>
+            <a:ext cx="1459054" cy="307777"/>
           </a:xfrm>
           <a:prstGeom prst="rect">
             <a:avLst/>
@@ -5290,23 +5957,23 @@
           <a:lstStyle/>
           <a:p>
             <a:r>
-              <a:rPr lang="en-IN" dirty="0" smtClean="0"/>
+              <a:rPr lang="en-IN" sz="1400" dirty="0" smtClean="0"/>
               <a:t>Digital Currency</a:t>
             </a:r>
-            <a:endParaRPr lang="en-IN" dirty="0"/>
-          </a:p>
-        </p:txBody>
-      </p:sp>
-      <p:sp>
-        <p:nvSpPr>
-          <p:cNvPr id="8" name="Rectangle 7"/>
+            <a:endParaRPr lang="en-IN" sz="1400" dirty="0"/>
+          </a:p>
+        </p:txBody>
+      </p:sp>
+      <p:sp>
+        <p:nvSpPr>
+          <p:cNvPr id="17" name="Rectangle 16"/>
           <p:cNvSpPr/>
           <p:nvPr/>
         </p:nvSpPr>
         <p:spPr>
           <a:xfrm>
-            <a:off x="3095836" y="2850906"/>
-            <a:ext cx="1950214" cy="369332"/>
+            <a:off x="3172276" y="586588"/>
+            <a:ext cx="1515095" cy="307777"/>
           </a:xfrm>
           <a:prstGeom prst="rect">
             <a:avLst/>
@@ -5319,14 +5986,45 @@
           <a:lstStyle/>
           <a:p>
             <a:r>
-              <a:rPr lang="en-IN" dirty="0" smtClean="0"/>
+              <a:rPr lang="en-IN" sz="1400" dirty="0" smtClean="0"/>
               <a:t>Virtual  </a:t>
             </a:r>
             <a:r>
-              <a:rPr lang="en-IN" dirty="0"/>
+              <a:rPr lang="en-IN" sz="1400" dirty="0"/>
               <a:t>Currency</a:t>
             </a:r>
-            <a:endParaRPr lang="en-IN" dirty="0"/>
+          </a:p>
+        </p:txBody>
+      </p:sp>
+      <p:sp>
+        <p:nvSpPr>
+          <p:cNvPr id="19" name="TextBox 18"/>
+          <p:cNvSpPr txBox="1"/>
+          <p:nvPr/>
+        </p:nvSpPr>
+        <p:spPr>
+          <a:xfrm>
+            <a:off x="3342049" y="1268760"/>
+            <a:ext cx="1301959" cy="461665"/>
+          </a:xfrm>
+          <a:prstGeom prst="rect">
+            <a:avLst/>
+          </a:prstGeom>
+          <a:noFill/>
+        </p:spPr>
+        <p:txBody>
+          <a:bodyPr wrap="none" rtlCol="0">
+            <a:spAutoFit/>
+          </a:bodyPr>
+          <a:lstStyle/>
+          <a:p>
+            <a:r>
+              <a:rPr lang="en-IN" sz="1200" dirty="0"/>
+              <a:t>Crypto Currency</a:t>
+            </a:r>
+          </a:p>
+          <a:p>
+            <a:endParaRPr lang="en-IN" sz="1200" dirty="0"/>
           </a:p>
         </p:txBody>
       </p:sp>
@@ -5370,27 +6068,179 @@
             <p:ph type="title"/>
           </p:nvPr>
         </p:nvSpPr>
-        <p:spPr/>
+        <p:spPr>
+          <a:xfrm>
+            <a:off x="329184" y="329184"/>
+            <a:ext cx="8635304" cy="457200"/>
+          </a:xfrm>
+        </p:spPr>
         <p:txBody>
           <a:bodyPr/>
           <a:lstStyle/>
           <a:p>
             <a:r>
-              <a:rPr lang="en-US" dirty="0" smtClean="0"/>
-              <a:t>How </a:t>
-            </a:r>
-            <a:r>
-              <a:rPr lang="en-US" dirty="0" err="1" smtClean="0"/>
+              <a:rPr lang="en-IN" dirty="0"/>
+              <a:t>Brief Interdiction to </a:t>
+            </a:r>
+            <a:r>
+              <a:rPr lang="en-IN" dirty="0" err="1" smtClean="0"/>
+              <a:t>bitcoin</a:t>
+            </a:r>
+            <a:r>
+              <a:rPr lang="en-IN" dirty="0" smtClean="0"/>
+              <a:t>.</a:t>
+            </a:r>
+            <a:endParaRPr lang="en-US" dirty="0"/>
+          </a:p>
+        </p:txBody>
+      </p:sp>
+      <p:sp>
+        <p:nvSpPr>
+          <p:cNvPr id="3" name="TextBox 2"/>
+          <p:cNvSpPr txBox="1"/>
+          <p:nvPr/>
+        </p:nvSpPr>
+        <p:spPr>
+          <a:xfrm>
+            <a:off x="354909" y="828388"/>
+            <a:ext cx="6637843" cy="523220"/>
+          </a:xfrm>
+          <a:prstGeom prst="rect">
+            <a:avLst/>
+          </a:prstGeom>
+          <a:noFill/>
+        </p:spPr>
+        <p:txBody>
+          <a:bodyPr wrap="none" rtlCol="0">
+            <a:spAutoFit/>
+          </a:bodyPr>
+          <a:lstStyle/>
+          <a:p>
+            <a:r>
+              <a:rPr lang="en-IN" sz="1400" dirty="0" err="1" smtClean="0"/>
               <a:t>Bitcoin</a:t>
             </a:r>
             <a:r>
-              <a:rPr lang="en-US" dirty="0" smtClean="0"/>
-              <a:t> works?</a:t>
-            </a:r>
-            <a:endParaRPr lang="en-US" dirty="0"/>
-          </a:p>
-        </p:txBody>
-      </p:sp>
+              <a:rPr lang="en-IN" sz="1400" dirty="0" smtClean="0"/>
+              <a:t> is a decentralized virtual crypto currency. It coming into being in year 2009</a:t>
+            </a:r>
+            <a:br>
+              <a:rPr lang="en-IN" sz="1400" dirty="0" smtClean="0"/>
+            </a:br>
+            <a:r>
+              <a:rPr lang="en-IN" sz="1400" dirty="0" smtClean="0"/>
+              <a:t>by a anonymous developer </a:t>
+            </a:r>
+            <a:r>
+              <a:rPr lang="en-IN" sz="1400" dirty="0"/>
+              <a:t> </a:t>
+            </a:r>
+            <a:r>
+              <a:rPr lang="en-IN" sz="1400" dirty="0">
+                <a:hlinkClick r:id="rId2"/>
+              </a:rPr>
+              <a:t>Satoshi </a:t>
+            </a:r>
+            <a:r>
+              <a:rPr lang="en-IN" sz="1400" dirty="0" err="1" smtClean="0">
+                <a:hlinkClick r:id="rId2"/>
+              </a:rPr>
+              <a:t>Nakamoto</a:t>
+            </a:r>
+            <a:r>
+              <a:rPr lang="en-IN" sz="1400" dirty="0" smtClean="0"/>
+              <a:t>.  </a:t>
+            </a:r>
+            <a:endParaRPr lang="en-IN" sz="1400" dirty="0"/>
+          </a:p>
+        </p:txBody>
+      </p:sp>
+      <p:sp>
+        <p:nvSpPr>
+          <p:cNvPr id="4" name="TextBox 3"/>
+          <p:cNvSpPr txBox="1"/>
+          <p:nvPr/>
+        </p:nvSpPr>
+        <p:spPr>
+          <a:xfrm>
+            <a:off x="367632" y="1556792"/>
+            <a:ext cx="8280920" cy="1015663"/>
+          </a:xfrm>
+          <a:prstGeom prst="rect">
+            <a:avLst/>
+          </a:prstGeom>
+          <a:noFill/>
+        </p:spPr>
+        <p:txBody>
+          <a:bodyPr wrap="square" rtlCol="0">
+            <a:spAutoFit/>
+          </a:bodyPr>
+          <a:lstStyle/>
+          <a:p>
+            <a:r>
+              <a:rPr lang="en-IN" sz="1400" dirty="0" err="1" smtClean="0"/>
+              <a:t>Bitcoin</a:t>
+            </a:r>
+            <a:r>
+              <a:rPr lang="en-IN" sz="1400" dirty="0" smtClean="0"/>
+              <a:t> was created using many grounding breaking ideas that will change the way we do financial transaction. One of the idea is </a:t>
+            </a:r>
+            <a:r>
+              <a:rPr lang="en-IN" sz="1400" b="1" dirty="0" smtClean="0"/>
+              <a:t>trust less consensus</a:t>
+            </a:r>
+            <a:r>
+              <a:rPr lang="en-IN" sz="1400" dirty="0" smtClean="0"/>
+              <a:t> which enable </a:t>
+            </a:r>
+            <a:r>
+              <a:rPr lang="en-IN" sz="1400" dirty="0" err="1" smtClean="0"/>
+              <a:t>bitcoin</a:t>
+            </a:r>
+            <a:r>
+              <a:rPr lang="en-IN" sz="1400" dirty="0" smtClean="0"/>
+              <a:t> user do money transaction with out any involvement of a </a:t>
+            </a:r>
+            <a:r>
+              <a:rPr lang="en-IN" sz="1400" b="1" dirty="0" smtClean="0"/>
+              <a:t>third party intermediary.</a:t>
+            </a:r>
+          </a:p>
+          <a:p>
+            <a:endParaRPr lang="en-IN" dirty="0"/>
+          </a:p>
+        </p:txBody>
+      </p:sp>
+      <p:pic>
+        <p:nvPicPr>
+          <p:cNvPr id="5" name="Picture 4"/>
+          <p:cNvPicPr>
+            <a:picLocks noChangeAspect="1"/>
+          </p:cNvPicPr>
+          <p:nvPr/>
+        </p:nvPicPr>
+        <p:blipFill>
+          <a:blip r:embed="rId3">
+            <a:extLst>
+              <a:ext uri="{28A0092B-C50C-407E-A947-70E740481C1C}">
+                <a14:useLocalDpi xmlns:a14="http://schemas.microsoft.com/office/drawing/2010/main" val="0"/>
+              </a:ext>
+            </a:extLst>
+          </a:blip>
+          <a:stretch>
+            <a:fillRect/>
+          </a:stretch>
+        </p:blipFill>
+        <p:spPr>
+          <a:xfrm>
+            <a:off x="278056" y="2348880"/>
+            <a:ext cx="8334375" cy="3736865"/>
+          </a:xfrm>
+          <a:prstGeom prst="rect">
+            <a:avLst/>
+          </a:prstGeom>
+        </p:spPr>
+      </p:pic>
     </p:spTree>
     <p:extLst>
       <p:ext uri="{BB962C8B-B14F-4D97-AF65-F5344CB8AC3E}">
@@ -5436,90 +6286,138 @@
           <a:bodyPr/>
           <a:lstStyle/>
           <a:p>
-            <a:endParaRPr lang="en-US"/>
-          </a:p>
-        </p:txBody>
-      </p:sp>
-      <p:sp>
-        <p:nvSpPr>
-          <p:cNvPr id="3" name="Content Placeholder 2"/>
-          <p:cNvSpPr>
-            <a:spLocks noGrp="1"/>
-          </p:cNvSpPr>
-          <p:nvPr>
-            <p:ph idx="1"/>
-          </p:nvPr>
-        </p:nvSpPr>
-        <p:spPr/>
-        <p:txBody>
-          <a:bodyPr/>
+            <a:r>
+              <a:rPr lang="en-IN" dirty="0" smtClean="0"/>
+              <a:t>Cryptography</a:t>
+            </a:r>
+            <a:endParaRPr lang="en-IN" dirty="0"/>
+          </a:p>
+        </p:txBody>
+      </p:sp>
+      <p:pic>
+        <p:nvPicPr>
+          <p:cNvPr id="7" name="Picture 6"/>
+          <p:cNvPicPr>
+            <a:picLocks noChangeAspect="1"/>
+          </p:cNvPicPr>
+          <p:nvPr/>
+        </p:nvPicPr>
+        <p:blipFill>
+          <a:blip r:embed="rId2">
+            <a:extLst>
+              <a:ext uri="{28A0092B-C50C-407E-A947-70E740481C1C}">
+                <a14:useLocalDpi xmlns:a14="http://schemas.microsoft.com/office/drawing/2010/main" val="0"/>
+              </a:ext>
+            </a:extLst>
+          </a:blip>
+          <a:stretch>
+            <a:fillRect/>
+          </a:stretch>
+        </p:blipFill>
+        <p:spPr>
+          <a:xfrm>
+            <a:off x="3131840" y="1793704"/>
+            <a:ext cx="4117198" cy="2044875"/>
+          </a:xfrm>
+          <a:prstGeom prst="rect">
+            <a:avLst/>
+          </a:prstGeom>
+        </p:spPr>
+      </p:pic>
+      <p:sp>
+        <p:nvSpPr>
+          <p:cNvPr id="8" name="TextBox 7"/>
+          <p:cNvSpPr txBox="1"/>
+          <p:nvPr/>
+        </p:nvSpPr>
+        <p:spPr>
+          <a:xfrm>
+            <a:off x="467544" y="1124744"/>
+            <a:ext cx="2441694" cy="369332"/>
+          </a:xfrm>
+          <a:prstGeom prst="rect">
+            <a:avLst/>
+          </a:prstGeom>
+          <a:noFill/>
+        </p:spPr>
+        <p:txBody>
+          <a:bodyPr wrap="none" rtlCol="0">
+            <a:spAutoFit/>
+          </a:bodyPr>
           <a:lstStyle/>
           <a:p>
-            <a:endParaRPr lang="en-US"/>
-          </a:p>
-        </p:txBody>
-      </p:sp>
-      <p:sp>
-        <p:nvSpPr>
-          <p:cNvPr id="4" name="Content Placeholder 3"/>
-          <p:cNvSpPr>
-            <a:spLocks noGrp="1"/>
-          </p:cNvSpPr>
-          <p:nvPr>
-            <p:ph idx="10"/>
-          </p:nvPr>
-        </p:nvSpPr>
-        <p:spPr/>
-        <p:txBody>
-          <a:bodyPr/>
+            <a:r>
+              <a:rPr lang="en-IN" dirty="0" smtClean="0"/>
+              <a:t>Public and private key</a:t>
+            </a:r>
+            <a:endParaRPr lang="en-IN" dirty="0"/>
+          </a:p>
+        </p:txBody>
+      </p:sp>
+      <p:pic>
+        <p:nvPicPr>
+          <p:cNvPr id="9" name="Picture 8"/>
+          <p:cNvPicPr>
+            <a:picLocks noChangeAspect="1"/>
+          </p:cNvPicPr>
+          <p:nvPr/>
+        </p:nvPicPr>
+        <p:blipFill>
+          <a:blip r:embed="rId3">
+            <a:extLst>
+              <a:ext uri="{28A0092B-C50C-407E-A947-70E740481C1C}">
+                <a14:useLocalDpi xmlns:a14="http://schemas.microsoft.com/office/drawing/2010/main" val="0"/>
+              </a:ext>
+            </a:extLst>
+          </a:blip>
+          <a:stretch>
+            <a:fillRect/>
+          </a:stretch>
+        </p:blipFill>
+        <p:spPr>
+          <a:xfrm>
+            <a:off x="2627784" y="4293096"/>
+            <a:ext cx="2950007" cy="2139738"/>
+          </a:xfrm>
+          <a:prstGeom prst="rect">
+            <a:avLst/>
+          </a:prstGeom>
+        </p:spPr>
+      </p:pic>
+      <p:sp>
+        <p:nvSpPr>
+          <p:cNvPr id="10" name="TextBox 9"/>
+          <p:cNvSpPr txBox="1"/>
+          <p:nvPr/>
+        </p:nvSpPr>
+        <p:spPr>
+          <a:xfrm>
+            <a:off x="353026" y="3854898"/>
+            <a:ext cx="1710725" cy="369332"/>
+          </a:xfrm>
+          <a:prstGeom prst="rect">
+            <a:avLst/>
+          </a:prstGeom>
+          <a:noFill/>
+        </p:spPr>
+        <p:txBody>
+          <a:bodyPr wrap="none" rtlCol="0">
+            <a:spAutoFit/>
+          </a:bodyPr>
           <a:lstStyle/>
           <a:p>
-            <a:endParaRPr lang="en-US"/>
-          </a:p>
-        </p:txBody>
-      </p:sp>
-      <p:sp>
-        <p:nvSpPr>
-          <p:cNvPr id="5" name="Text Placeholder 4"/>
-          <p:cNvSpPr>
-            <a:spLocks noGrp="1"/>
-          </p:cNvSpPr>
-          <p:nvPr>
-            <p:ph type="body" sz="quarter" idx="11"/>
-          </p:nvPr>
-        </p:nvSpPr>
-        <p:spPr/>
-        <p:txBody>
-          <a:bodyPr/>
-          <a:lstStyle/>
-          <a:p>
-            <a:endParaRPr lang="en-US"/>
-          </a:p>
-        </p:txBody>
-      </p:sp>
-      <p:sp>
-        <p:nvSpPr>
-          <p:cNvPr id="6" name="Text Placeholder 5"/>
-          <p:cNvSpPr>
-            <a:spLocks noGrp="1"/>
-          </p:cNvSpPr>
-          <p:nvPr>
-            <p:ph type="body" sz="quarter" idx="12"/>
-          </p:nvPr>
-        </p:nvSpPr>
-        <p:spPr/>
-        <p:txBody>
-          <a:bodyPr/>
-          <a:lstStyle/>
-          <a:p>
-            <a:endParaRPr lang="en-US"/>
+            <a:r>
+              <a:rPr lang="en-IN" dirty="0" smtClean="0"/>
+              <a:t>Hash functions</a:t>
+            </a:r>
+            <a:endParaRPr lang="en-IN" dirty="0"/>
           </a:p>
         </p:txBody>
       </p:sp>
     </p:spTree>
     <p:extLst>
       <p:ext uri="{BB962C8B-B14F-4D97-AF65-F5344CB8AC3E}">
-        <p14:creationId xmlns:p14="http://schemas.microsoft.com/office/powerpoint/2010/main" val="1263475699"/>
+        <p14:creationId xmlns:p14="http://schemas.microsoft.com/office/powerpoint/2010/main" val="4088244973"/>
       </p:ext>
     </p:extLst>
   </p:cSld>
@@ -5548,45 +6446,7 @@
       </p:grpSpPr>
       <p:sp>
         <p:nvSpPr>
-          <p:cNvPr id="2" name="Text Placeholder 1"/>
-          <p:cNvSpPr>
-            <a:spLocks noGrp="1"/>
-          </p:cNvSpPr>
-          <p:nvPr>
-            <p:ph type="body" sz="quarter" idx="12"/>
-          </p:nvPr>
-        </p:nvSpPr>
-        <p:spPr/>
-        <p:txBody>
-          <a:bodyPr/>
-          <a:lstStyle/>
-          <a:p>
-            <a:endParaRPr lang="en-US"/>
-          </a:p>
-        </p:txBody>
-      </p:sp>
-      <p:sp>
-        <p:nvSpPr>
-          <p:cNvPr id="3" name="Content Placeholder 2"/>
-          <p:cNvSpPr>
-            <a:spLocks noGrp="1"/>
-          </p:cNvSpPr>
-          <p:nvPr>
-            <p:ph sz="half" idx="1"/>
-          </p:nvPr>
-        </p:nvSpPr>
-        <p:spPr/>
-        <p:txBody>
-          <a:bodyPr/>
-          <a:lstStyle/>
-          <a:p>
-            <a:endParaRPr lang="en-US"/>
-          </a:p>
-        </p:txBody>
-      </p:sp>
-      <p:sp>
-        <p:nvSpPr>
-          <p:cNvPr id="4" name="Title 3"/>
+          <p:cNvPr id="2" name="Title 1"/>
           <p:cNvSpPr>
             <a:spLocks noGrp="1"/>
           </p:cNvSpPr>
@@ -5599,28 +6459,84 @@
           <a:bodyPr/>
           <a:lstStyle/>
           <a:p>
-            <a:endParaRPr lang="en-US"/>
-          </a:p>
-        </p:txBody>
-      </p:sp>
+            <a:r>
+              <a:rPr lang="en-IN" dirty="0" smtClean="0"/>
+              <a:t>Block Chain</a:t>
+            </a:r>
+            <a:endParaRPr lang="en-IN" dirty="0"/>
+          </a:p>
+        </p:txBody>
+      </p:sp>
+      <p:pic>
+        <p:nvPicPr>
+          <p:cNvPr id="6" name="Picture 5"/>
+          <p:cNvPicPr>
+            <a:picLocks noChangeAspect="1"/>
+          </p:cNvPicPr>
+          <p:nvPr/>
+        </p:nvPicPr>
+        <p:blipFill>
+          <a:blip r:embed="rId2">
+            <a:extLst>
+              <a:ext uri="{28A0092B-C50C-407E-A947-70E740481C1C}">
+                <a14:useLocalDpi xmlns:a14="http://schemas.microsoft.com/office/drawing/2010/main" val="0"/>
+              </a:ext>
+            </a:extLst>
+          </a:blip>
+          <a:stretch>
+            <a:fillRect/>
+          </a:stretch>
+        </p:blipFill>
+        <p:spPr>
+          <a:xfrm>
+            <a:off x="1410083" y="786384"/>
+            <a:ext cx="6241538" cy="2212971"/>
+          </a:xfrm>
+          <a:prstGeom prst="rect">
+            <a:avLst/>
+          </a:prstGeom>
+        </p:spPr>
+      </p:pic>
+      <p:pic>
+        <p:nvPicPr>
+          <p:cNvPr id="7" name="Picture 6"/>
+          <p:cNvPicPr>
+            <a:picLocks noChangeAspect="1"/>
+          </p:cNvPicPr>
+          <p:nvPr/>
+        </p:nvPicPr>
+        <p:blipFill>
+          <a:blip r:embed="rId3">
+            <a:extLst>
+              <a:ext uri="{28A0092B-C50C-407E-A947-70E740481C1C}">
+                <a14:useLocalDpi xmlns:a14="http://schemas.microsoft.com/office/drawing/2010/main" val="0"/>
+              </a:ext>
+            </a:extLst>
+          </a:blip>
+          <a:stretch>
+            <a:fillRect/>
+          </a:stretch>
+        </p:blipFill>
+        <p:spPr>
+          <a:xfrm>
+            <a:off x="1473113" y="3573016"/>
+            <a:ext cx="6115477" cy="2567756"/>
+          </a:xfrm>
+          <a:prstGeom prst="rect">
+            <a:avLst/>
+          </a:prstGeom>
+        </p:spPr>
+      </p:pic>
     </p:spTree>
     <p:extLst>
       <p:ext uri="{BB962C8B-B14F-4D97-AF65-F5344CB8AC3E}">
-        <p14:creationId xmlns:p14="http://schemas.microsoft.com/office/powerpoint/2010/main" val="3743229450"/>
+        <p14:creationId xmlns:p14="http://schemas.microsoft.com/office/powerpoint/2010/main" val="348011756"/>
       </p:ext>
     </p:extLst>
   </p:cSld>
   <p:clrMapOvr>
     <a:masterClrMapping/>
   </p:clrMapOvr>
-  <mc:AlternateContent xmlns:mc="http://schemas.openxmlformats.org/markup-compatibility/2006" xmlns:p14="http://schemas.microsoft.com/office/powerpoint/2010/main">
-    <mc:Choice Requires="p14">
-      <p:transition spd="slow" p14:dur="2000"/>
-    </mc:Choice>
-    <mc:Fallback xmlns="">
-      <p:transition spd="slow"/>
-    </mc:Fallback>
-  </mc:AlternateContent>
 </p:sld>
 </file>
 
@@ -5641,78 +6557,46 @@
           <a:chExt cx="0" cy="0"/>
         </a:xfrm>
       </p:grpSpPr>
-      <p:sp>
-        <p:nvSpPr>
-          <p:cNvPr id="2" name="Content Placeholder 1"/>
-          <p:cNvSpPr>
-            <a:spLocks noGrp="1"/>
-          </p:cNvSpPr>
-          <p:nvPr>
-            <p:ph sz="half" idx="1"/>
-          </p:nvPr>
-        </p:nvSpPr>
-        <p:spPr/>
-        <p:txBody>
-          <a:bodyPr/>
-          <a:lstStyle/>
-          <a:p>
-            <a:endParaRPr lang="en-US"/>
-          </a:p>
-        </p:txBody>
-      </p:sp>
-      <p:sp>
-        <p:nvSpPr>
-          <p:cNvPr id="3" name="Picture Placeholder 2"/>
-          <p:cNvSpPr>
-            <a:spLocks noGrp="1"/>
-          </p:cNvSpPr>
-          <p:nvPr>
-            <p:ph type="pic" sz="quarter" idx="10"/>
-          </p:nvPr>
-        </p:nvSpPr>
-        <p:spPr/>
-      </p:sp>
-      <p:sp>
-        <p:nvSpPr>
-          <p:cNvPr id="4" name="Title 3"/>
-          <p:cNvSpPr>
-            <a:spLocks noGrp="1"/>
-          </p:cNvSpPr>
-          <p:nvPr>
-            <p:ph type="title"/>
-          </p:nvPr>
-        </p:nvSpPr>
-        <p:spPr/>
-        <p:txBody>
-          <a:bodyPr/>
-          <a:lstStyle/>
-          <a:p>
-            <a:endParaRPr lang="en-US"/>
-          </a:p>
-        </p:txBody>
-      </p:sp>
+      <p:pic>
+        <p:nvPicPr>
+          <p:cNvPr id="5" name="Picture 4"/>
+          <p:cNvPicPr>
+            <a:picLocks noChangeAspect="1"/>
+          </p:cNvPicPr>
+          <p:nvPr/>
+        </p:nvPicPr>
+        <p:blipFill>
+          <a:blip r:embed="rId2">
+            <a:extLst>
+              <a:ext uri="{28A0092B-C50C-407E-A947-70E740481C1C}">
+                <a14:useLocalDpi xmlns:a14="http://schemas.microsoft.com/office/drawing/2010/main" val="0"/>
+              </a:ext>
+            </a:extLst>
+          </a:blip>
+          <a:stretch>
+            <a:fillRect/>
+          </a:stretch>
+        </p:blipFill>
+        <p:spPr>
+          <a:xfrm>
+            <a:off x="3352800" y="1738312"/>
+            <a:ext cx="2438400" cy="3381375"/>
+          </a:xfrm>
+          <a:prstGeom prst="rect">
+            <a:avLst/>
+          </a:prstGeom>
+        </p:spPr>
+      </p:pic>
     </p:spTree>
     <p:extLst>
       <p:ext uri="{BB962C8B-B14F-4D97-AF65-F5344CB8AC3E}">
-        <p14:creationId xmlns:p14="http://schemas.microsoft.com/office/powerpoint/2010/main" val="1461746298"/>
+        <p14:creationId xmlns:p14="http://schemas.microsoft.com/office/powerpoint/2010/main" val="4223693133"/>
       </p:ext>
     </p:extLst>
   </p:cSld>
   <p:clrMapOvr>
     <a:masterClrMapping/>
   </p:clrMapOvr>
-  <mc:AlternateContent xmlns:mc="http://schemas.openxmlformats.org/markup-compatibility/2006" xmlns:p14="http://schemas.microsoft.com/office/powerpoint/2010/main">
-    <mc:Choice Requires="p14">
-      <p:transition spd="med" p14:dur="700">
-        <p:fade/>
-      </p:transition>
-    </mc:Choice>
-    <mc:Fallback xmlns="">
-      <p:transition xmlns:p14="http://schemas.microsoft.com/office/powerpoint/2010/main" spd="med">
-        <p:fade/>
-      </p:transition>
-    </mc:Fallback>
-  </mc:AlternateContent>
 </p:sld>
 </file>
 
@@ -5733,116 +6617,46 @@
           <a:chExt cx="0" cy="0"/>
         </a:xfrm>
       </p:grpSpPr>
-      <p:sp>
-        <p:nvSpPr>
-          <p:cNvPr id="6" name="Content Placeholder 5"/>
-          <p:cNvSpPr>
-            <a:spLocks noGrp="1"/>
-          </p:cNvSpPr>
-          <p:nvPr>
-            <p:ph sz="half" idx="1"/>
-          </p:nvPr>
-        </p:nvSpPr>
-        <p:spPr/>
-        <p:txBody>
-          <a:bodyPr/>
-          <a:lstStyle/>
-          <a:p>
-            <a:endParaRPr lang="en-US" dirty="0"/>
-          </a:p>
-        </p:txBody>
-      </p:sp>
-      <p:sp>
-        <p:nvSpPr>
-          <p:cNvPr id="7" name="Picture Placeholder 6"/>
-          <p:cNvSpPr>
-            <a:spLocks noGrp="1"/>
-          </p:cNvSpPr>
-          <p:nvPr>
-            <p:ph type="pic" sz="quarter" idx="10"/>
-          </p:nvPr>
-        </p:nvSpPr>
-        <p:spPr/>
-      </p:sp>
-      <p:sp>
-        <p:nvSpPr>
-          <p:cNvPr id="5" name="Title 4"/>
-          <p:cNvSpPr>
-            <a:spLocks noGrp="1"/>
-          </p:cNvSpPr>
-          <p:nvPr>
-            <p:ph type="title"/>
-          </p:nvPr>
-        </p:nvSpPr>
-        <p:spPr/>
-        <p:txBody>
-          <a:bodyPr/>
-          <a:lstStyle/>
-          <a:p>
-            <a:endParaRPr lang="en-US" dirty="0"/>
-          </a:p>
-        </p:txBody>
-      </p:sp>
-      <p:sp>
-        <p:nvSpPr>
-          <p:cNvPr id="8" name="Content Placeholder 7"/>
-          <p:cNvSpPr>
-            <a:spLocks noGrp="1"/>
-          </p:cNvSpPr>
-          <p:nvPr>
-            <p:ph sz="half" idx="11"/>
-          </p:nvPr>
-        </p:nvSpPr>
-        <p:spPr/>
-        <p:txBody>
-          <a:bodyPr/>
-          <a:lstStyle/>
-          <a:p>
-            <a:endParaRPr lang="en-US" dirty="0"/>
-          </a:p>
-        </p:txBody>
-      </p:sp>
-      <p:sp>
-        <p:nvSpPr>
-          <p:cNvPr id="9" name="Content Placeholder 8"/>
-          <p:cNvSpPr>
-            <a:spLocks noGrp="1"/>
-          </p:cNvSpPr>
-          <p:nvPr>
-            <p:ph sz="half" idx="12"/>
-          </p:nvPr>
-        </p:nvSpPr>
-        <p:spPr/>
-        <p:txBody>
-          <a:bodyPr/>
-          <a:lstStyle/>
-          <a:p>
-            <a:endParaRPr lang="en-US" dirty="0"/>
-          </a:p>
-        </p:txBody>
-      </p:sp>
+      <p:pic>
+        <p:nvPicPr>
+          <p:cNvPr id="5" name="Picture 4"/>
+          <p:cNvPicPr>
+            <a:picLocks noChangeAspect="1"/>
+          </p:cNvPicPr>
+          <p:nvPr/>
+        </p:nvPicPr>
+        <p:blipFill>
+          <a:blip r:embed="rId2">
+            <a:extLst>
+              <a:ext uri="{28A0092B-C50C-407E-A947-70E740481C1C}">
+                <a14:useLocalDpi xmlns:a14="http://schemas.microsoft.com/office/drawing/2010/main" val="0"/>
+              </a:ext>
+            </a:extLst>
+          </a:blip>
+          <a:stretch>
+            <a:fillRect/>
+          </a:stretch>
+        </p:blipFill>
+        <p:spPr>
+          <a:xfrm>
+            <a:off x="1019175" y="1028700"/>
+            <a:ext cx="7105650" cy="4800600"/>
+          </a:xfrm>
+          <a:prstGeom prst="rect">
+            <a:avLst/>
+          </a:prstGeom>
+        </p:spPr>
+      </p:pic>
     </p:spTree>
     <p:extLst>
       <p:ext uri="{BB962C8B-B14F-4D97-AF65-F5344CB8AC3E}">
-        <p14:creationId xmlns:p14="http://schemas.microsoft.com/office/powerpoint/2010/main" val="642860157"/>
+        <p14:creationId xmlns:p14="http://schemas.microsoft.com/office/powerpoint/2010/main" val="2087233981"/>
       </p:ext>
     </p:extLst>
   </p:cSld>
   <p:clrMapOvr>
     <a:masterClrMapping/>
   </p:clrMapOvr>
-  <mc:AlternateContent xmlns:mc="http://schemas.openxmlformats.org/markup-compatibility/2006" xmlns:p14="http://schemas.microsoft.com/office/powerpoint/2010/main">
-    <mc:Choice Requires="p14">
-      <p:transition spd="med" p14:dur="700">
-        <p:fade/>
-      </p:transition>
-    </mc:Choice>
-    <mc:Fallback xmlns="">
-      <p:transition xmlns:p14="http://schemas.microsoft.com/office/powerpoint/2010/main" spd="med">
-        <p:fade/>
-      </p:transition>
-    </mc:Fallback>
-  </mc:AlternateContent>
 </p:sld>
 </file>
 

</xml_diff>